<commit_message>
updated presentation with dog classifier results
</commit_message>
<xml_diff>
--- a/final_presentation.pptx
+++ b/final_presentation.pptx
@@ -205,7 +205,7 @@
           <a:p>
             <a:fld id="{8F171782-AB64-458D-AF37-69C59442B371}" type="datetimeFigureOut">
               <a:rPr lang="en-CA"/>
-              <a:t>2022-04-04</a:t>
+              <a:t>2022-04-08</a:t>
             </a:fld>
             <a:endParaRPr lang="en-US"/>
           </a:p>
@@ -1234,7 +1234,19 @@
           <a:bodyPr/>
           <a:lstStyle/>
           <a:p>
+            <a:r>
+              <a:rPr lang="en-US" dirty="0"/>
+              <a:t>The model achieved a mean average precision or MAP of 0.74 on the test data, indicating that the model performs very well.</a:t>
+            </a:r>
+          </a:p>
+          <a:p>
             <a:endParaRPr lang="en-US" dirty="0"/>
+          </a:p>
+          <a:p>
+            <a:r>
+              <a:rPr lang="en-US" dirty="0"/>
+              <a:t>When we further broken the test data down into small, medium and large dogs, the model achieved MAP values of 0.61, 0.77, 0.78.  Indicating that while the model does perform worse on small dogs, it still performs quite well.</a:t>
+            </a:r>
           </a:p>
         </p:txBody>
       </p:sp>
@@ -1318,46 +1330,7 @@
           <a:bodyPr/>
           <a:lstStyle/>
           <a:p>
-            <a:r>
-              <a:rPr lang="en-US" dirty="0"/>
-              <a:t>There are two reasons why this is an important project.</a:t>
-            </a:r>
-          </a:p>
-          <a:p>
             <a:endParaRPr lang="en-US" dirty="0"/>
-          </a:p>
-          <a:p>
-            <a:r>
-              <a:rPr lang="en-US" dirty="0"/>
-              <a:t>ANIMATION</a:t>
-            </a:r>
-          </a:p>
-          <a:p>
-            <a:endParaRPr lang="en-US" dirty="0"/>
-          </a:p>
-          <a:p>
-            <a:r>
-              <a:rPr lang="en-US" dirty="0"/>
-              <a:t>The first is our project has real world applications.  The most notable example is the possibility of integration with existing applications like the BC SPCAS “pet search” web app that can be used to find lost or found dogs.</a:t>
-            </a:r>
-          </a:p>
-          <a:p>
-            <a:endParaRPr lang="en-US" dirty="0"/>
-          </a:p>
-          <a:p>
-            <a:r>
-              <a:rPr lang="en-US" dirty="0"/>
-              <a:t>ANIMATION</a:t>
-            </a:r>
-          </a:p>
-          <a:p>
-            <a:endParaRPr lang="en-US" dirty="0"/>
-          </a:p>
-          <a:p>
-            <a:r>
-              <a:rPr lang="en-US" dirty="0"/>
-              <a:t>The second is that our project is a meaningful contribution to the work in dog-identification.  Existing work only uses an unrealistic data made up of almost perfect front-facing images of dog faces.  In contrast we have created a realistic dataset that contains multiple images for thousands of dogs in a variety of positions.</a:t>
-            </a:r>
           </a:p>
         </p:txBody>
       </p:sp>
@@ -1838,7 +1811,7 @@
           <a:p>
             <a:fld id="{C764DE79-268F-4C1A-8933-263129D2AF90}" type="datetimeFigureOut">
               <a:rPr lang="en-US" dirty="0"/>
-              <a:t>4/4/2022</a:t>
+              <a:t>4/8/2022</a:t>
             </a:fld>
             <a:endParaRPr lang="en-US"/>
           </a:p>
@@ -2006,7 +1979,7 @@
           <a:p>
             <a:fld id="{C764DE79-268F-4C1A-8933-263129D2AF90}" type="datetimeFigureOut">
               <a:rPr lang="en-US" dirty="0"/>
-              <a:t>4/4/2022</a:t>
+              <a:t>4/8/2022</a:t>
             </a:fld>
             <a:endParaRPr lang="en-US"/>
           </a:p>
@@ -2184,7 +2157,7 @@
           <a:p>
             <a:fld id="{C764DE79-268F-4C1A-8933-263129D2AF90}" type="datetimeFigureOut">
               <a:rPr lang="en-US" dirty="0"/>
-              <a:t>4/4/2022</a:t>
+              <a:t>4/8/2022</a:t>
             </a:fld>
             <a:endParaRPr lang="en-US"/>
           </a:p>
@@ -2352,7 +2325,7 @@
           <a:p>
             <a:fld id="{C764DE79-268F-4C1A-8933-263129D2AF90}" type="datetimeFigureOut">
               <a:rPr lang="en-US" dirty="0"/>
-              <a:t>4/4/2022</a:t>
+              <a:t>4/8/2022</a:t>
             </a:fld>
             <a:endParaRPr lang="en-US"/>
           </a:p>
@@ -2597,7 +2570,7 @@
           <a:p>
             <a:fld id="{C764DE79-268F-4C1A-8933-263129D2AF90}" type="datetimeFigureOut">
               <a:rPr lang="en-US" dirty="0"/>
-              <a:t>4/4/2022</a:t>
+              <a:t>4/8/2022</a:t>
             </a:fld>
             <a:endParaRPr lang="en-US"/>
           </a:p>
@@ -2826,7 +2799,7 @@
           <a:p>
             <a:fld id="{C764DE79-268F-4C1A-8933-263129D2AF90}" type="datetimeFigureOut">
               <a:rPr lang="en-US" dirty="0"/>
-              <a:t>4/4/2022</a:t>
+              <a:t>4/8/2022</a:t>
             </a:fld>
             <a:endParaRPr lang="en-US"/>
           </a:p>
@@ -3190,7 +3163,7 @@
           <a:p>
             <a:fld id="{C764DE79-268F-4C1A-8933-263129D2AF90}" type="datetimeFigureOut">
               <a:rPr lang="en-US" dirty="0"/>
-              <a:t>4/4/2022</a:t>
+              <a:t>4/8/2022</a:t>
             </a:fld>
             <a:endParaRPr lang="en-US"/>
           </a:p>
@@ -3307,7 +3280,7 @@
           <a:p>
             <a:fld id="{C764DE79-268F-4C1A-8933-263129D2AF90}" type="datetimeFigureOut">
               <a:rPr lang="en-US" dirty="0"/>
-              <a:t>4/4/2022</a:t>
+              <a:t>4/8/2022</a:t>
             </a:fld>
             <a:endParaRPr lang="en-US"/>
           </a:p>
@@ -3402,7 +3375,7 @@
           <a:p>
             <a:fld id="{C764DE79-268F-4C1A-8933-263129D2AF90}" type="datetimeFigureOut">
               <a:rPr lang="en-US" dirty="0"/>
-              <a:t>4/4/2022</a:t>
+              <a:t>4/8/2022</a:t>
             </a:fld>
             <a:endParaRPr lang="en-US"/>
           </a:p>
@@ -3677,7 +3650,7 @@
           <a:p>
             <a:fld id="{C764DE79-268F-4C1A-8933-263129D2AF90}" type="datetimeFigureOut">
               <a:rPr lang="en-US" dirty="0"/>
-              <a:t>4/4/2022</a:t>
+              <a:t>4/8/2022</a:t>
             </a:fld>
             <a:endParaRPr lang="en-US"/>
           </a:p>
@@ -3929,7 +3902,7 @@
           <a:p>
             <a:fld id="{C764DE79-268F-4C1A-8933-263129D2AF90}" type="datetimeFigureOut">
               <a:rPr lang="en-US" dirty="0"/>
-              <a:t>4/4/2022</a:t>
+              <a:t>4/8/2022</a:t>
             </a:fld>
             <a:endParaRPr lang="en-US"/>
           </a:p>
@@ -4140,7 +4113,7 @@
           <a:p>
             <a:fld id="{C764DE79-268F-4C1A-8933-263129D2AF90}" type="datetimeFigureOut">
               <a:rPr lang="en-US" dirty="0"/>
-              <a:t>4/4/2022</a:t>
+              <a:t>4/8/2022</a:t>
             </a:fld>
             <a:endParaRPr lang="en-US"/>
           </a:p>
@@ -8137,7 +8110,6 @@
               </a:rPr>
               <a:t>Stanford Dogs Dataset</a:t>
             </a:r>
-            <a:endParaRPr lang="zh-CN" sz="3200" dirty="0"/>
           </a:p>
         </p:txBody>
       </p:sp>
@@ -8530,7 +8502,7 @@
                 <a:ea typeface="+mn-lt"/>
                 <a:cs typeface="+mn-lt"/>
               </a:rPr>
-              <a:t>Achieved MAP of 0.72, 0.73, and 0.74 on small, medium and large dogs respectively</a:t>
+              <a:t>Achieved MAP of 0.61, 0.77, and 0.78 on small, medium and large dogs respectively</a:t>
             </a:r>
             <a:endParaRPr lang="zh-CN" sz="3200" dirty="0"/>
           </a:p>
@@ -9055,6 +9027,211 @@
           </a:p>
         </p:txBody>
       </p:sp>
+      <p:sp>
+        <p:nvSpPr>
+          <p:cNvPr id="7" name="文本框 4">
+            <a:extLst>
+              <a:ext uri="{FF2B5EF4-FFF2-40B4-BE49-F238E27FC236}">
+                <a16:creationId xmlns:a16="http://schemas.microsoft.com/office/drawing/2014/main" id="{4FA5D0E2-4A21-4360-9463-BD4C322FB450}"/>
+              </a:ext>
+            </a:extLst>
+          </p:cNvPr>
+          <p:cNvSpPr txBox="1"/>
+          <p:nvPr/>
+        </p:nvSpPr>
+        <p:spPr>
+          <a:xfrm>
+            <a:off x="182063" y="2124629"/>
+            <a:ext cx="9807063" cy="430887"/>
+          </a:xfrm>
+          <a:prstGeom prst="rect">
+            <a:avLst/>
+          </a:prstGeom>
+          <a:noFill/>
+        </p:spPr>
+        <p:txBody>
+          <a:bodyPr rot="0" spcFirstLastPara="0" vertOverflow="overflow" horzOverflow="overflow" vert="horz" wrap="square" lIns="91440" tIns="45720" rIns="91440" bIns="45720" numCol="1" spcCol="0" rtlCol="0" fromWordArt="0" anchor="t" anchorCtr="0" forceAA="0" compatLnSpc="1">
+            <a:prstTxWarp prst="textNoShape">
+              <a:avLst/>
+            </a:prstTxWarp>
+            <a:spAutoFit/>
+          </a:bodyPr>
+          <a:lstStyle/>
+          <a:p>
+            <a:pPr marL="457200" indent="-457200">
+              <a:buFont typeface="Arial" panose="020B0604020202020204" pitchFamily="34" charset="0"/>
+              <a:buChar char="•"/>
+            </a:pPr>
+            <a:r>
+              <a:rPr lang="en-US" altLang="zh-CN" sz="2200" dirty="0">
+                <a:ea typeface="+mn-lt"/>
+                <a:cs typeface="+mn-lt"/>
+              </a:rPr>
+              <a:t>Achieved top one accuracy of 97% and 96% on the validation and test data sets. </a:t>
+            </a:r>
+          </a:p>
+        </p:txBody>
+      </p:sp>
+      <p:sp>
+        <p:nvSpPr>
+          <p:cNvPr id="9" name="Equals 8">
+            <a:extLst>
+              <a:ext uri="{FF2B5EF4-FFF2-40B4-BE49-F238E27FC236}">
+                <a16:creationId xmlns:a16="http://schemas.microsoft.com/office/drawing/2014/main" id="{5DF8F42C-F1D8-44B6-B88F-C7F0BD832C65}"/>
+              </a:ext>
+            </a:extLst>
+          </p:cNvPr>
+          <p:cNvSpPr/>
+          <p:nvPr/>
+        </p:nvSpPr>
+        <p:spPr>
+          <a:xfrm>
+            <a:off x="5867874" y="4152296"/>
+            <a:ext cx="409575" cy="300379"/>
+          </a:xfrm>
+          <a:prstGeom prst="mathEqual">
+            <a:avLst/>
+          </a:prstGeom>
+          <a:solidFill>
+            <a:schemeClr val="tx1"/>
+          </a:solidFill>
+          <a:ln w="6350"/>
+        </p:spPr>
+        <p:style>
+          <a:lnRef idx="2">
+            <a:schemeClr val="accent1">
+              <a:shade val="50000"/>
+            </a:schemeClr>
+          </a:lnRef>
+          <a:fillRef idx="1">
+            <a:schemeClr val="accent1"/>
+          </a:fillRef>
+          <a:effectRef idx="0">
+            <a:schemeClr val="accent1"/>
+          </a:effectRef>
+          <a:fontRef idx="minor">
+            <a:schemeClr val="lt1"/>
+          </a:fontRef>
+        </p:style>
+        <p:txBody>
+          <a:bodyPr rtlCol="0" anchor="ctr"/>
+          <a:lstStyle/>
+          <a:p>
+            <a:pPr algn="ctr"/>
+            <a:endParaRPr lang="en-CA">
+              <a:solidFill>
+                <a:schemeClr val="tx1"/>
+              </a:solidFill>
+            </a:endParaRPr>
+          </a:p>
+        </p:txBody>
+      </p:sp>
+      <p:sp>
+        <p:nvSpPr>
+          <p:cNvPr id="10" name="TextBox 9">
+            <a:extLst>
+              <a:ext uri="{FF2B5EF4-FFF2-40B4-BE49-F238E27FC236}">
+                <a16:creationId xmlns:a16="http://schemas.microsoft.com/office/drawing/2014/main" id="{7E46A69B-BC5B-47D0-A9AD-026994A4E8E0}"/>
+              </a:ext>
+            </a:extLst>
+          </p:cNvPr>
+          <p:cNvSpPr txBox="1"/>
+          <p:nvPr/>
+        </p:nvSpPr>
+        <p:spPr>
+          <a:xfrm>
+            <a:off x="5819043" y="3709004"/>
+            <a:ext cx="465009" cy="553998"/>
+          </a:xfrm>
+          <a:prstGeom prst="rect">
+            <a:avLst/>
+          </a:prstGeom>
+          <a:noFill/>
+        </p:spPr>
+        <p:txBody>
+          <a:bodyPr wrap="square" rtlCol="0">
+            <a:spAutoFit/>
+          </a:bodyPr>
+          <a:lstStyle/>
+          <a:p>
+            <a:pPr algn="ctr"/>
+            <a:r>
+              <a:rPr lang="en-CA" sz="3000" b="1" dirty="0"/>
+              <a:t>?</a:t>
+            </a:r>
+          </a:p>
+        </p:txBody>
+      </p:sp>
+      <p:pic>
+        <p:nvPicPr>
+          <p:cNvPr id="11" name="Picture 10" descr="A dog lying in the grass&#10;&#10;Description automatically generated with medium confidence">
+            <a:extLst>
+              <a:ext uri="{FF2B5EF4-FFF2-40B4-BE49-F238E27FC236}">
+                <a16:creationId xmlns:a16="http://schemas.microsoft.com/office/drawing/2014/main" id="{1526AF7D-F2F8-430D-9940-9697E04EE395}"/>
+              </a:ext>
+            </a:extLst>
+          </p:cNvPr>
+          <p:cNvPicPr>
+            <a:picLocks noChangeAspect="1"/>
+          </p:cNvPicPr>
+          <p:nvPr/>
+        </p:nvPicPr>
+        <p:blipFill rotWithShape="1">
+          <a:blip r:embed="rId4">
+            <a:extLst>
+              <a:ext uri="{28A0092B-C50C-407E-A947-70E740481C1C}">
+                <a14:useLocalDpi xmlns:a14="http://schemas.microsoft.com/office/drawing/2010/main" val="0"/>
+              </a:ext>
+            </a:extLst>
+          </a:blip>
+          <a:srcRect l="9315" t="7696" r="22709" b="6483"/>
+          <a:stretch/>
+        </p:blipFill>
+        <p:spPr>
+          <a:xfrm>
+            <a:off x="4276570" y="3503164"/>
+            <a:ext cx="1542473" cy="1298263"/>
+          </a:xfrm>
+          <a:prstGeom prst="rect">
+            <a:avLst/>
+          </a:prstGeom>
+        </p:spPr>
+      </p:pic>
+      <p:sp>
+        <p:nvSpPr>
+          <p:cNvPr id="3" name="TextBox 2">
+            <a:extLst>
+              <a:ext uri="{FF2B5EF4-FFF2-40B4-BE49-F238E27FC236}">
+                <a16:creationId xmlns:a16="http://schemas.microsoft.com/office/drawing/2014/main" id="{52CC0D31-89E0-4287-858F-6A683473F4C7}"/>
+              </a:ext>
+            </a:extLst>
+          </p:cNvPr>
+          <p:cNvSpPr txBox="1"/>
+          <p:nvPr/>
+        </p:nvSpPr>
+        <p:spPr>
+          <a:xfrm>
+            <a:off x="6277449" y="4063958"/>
+            <a:ext cx="2789695" cy="477054"/>
+          </a:xfrm>
+          <a:prstGeom prst="rect">
+            <a:avLst/>
+          </a:prstGeom>
+          <a:noFill/>
+        </p:spPr>
+        <p:txBody>
+          <a:bodyPr wrap="square" rtlCol="0">
+            <a:spAutoFit/>
+          </a:bodyPr>
+          <a:lstStyle/>
+          <a:p>
+            <a:r>
+              <a:rPr lang="en-CA" sz="2500" b="1" dirty="0"/>
+              <a:t>Golden Retriever</a:t>
+            </a:r>
+          </a:p>
+        </p:txBody>
+      </p:sp>
     </p:spTree>
     <p:extLst>
       <p:ext uri="{BB962C8B-B14F-4D97-AF65-F5344CB8AC3E}">
@@ -9360,7 +9537,7 @@
                 <a:ea typeface="+mn-lt"/>
                 <a:cs typeface="+mn-lt"/>
               </a:rPr>
-              <a:t>Achieved Classification Accuracy of 79% over randomly selected images of the same or different dogs (of the same breed)</a:t>
+              <a:t>Achieved Classification Accuracy of 79% over randomly selected images of the same or different dogs (from the same breed)</a:t>
             </a:r>
           </a:p>
         </p:txBody>

</xml_diff>

<commit_message>
updated the presentation ppt
</commit_message>
<xml_diff>
--- a/final_presentation.pptx
+++ b/final_presentation.pptx
@@ -5,18 +5,16 @@
     <p:sldMasterId id="2147483672" r:id="rId1"/>
   </p:sldMasterIdLst>
   <p:notesMasterIdLst>
-    <p:notesMasterId r:id="rId11"/>
+    <p:notesMasterId r:id="rId9"/>
   </p:notesMasterIdLst>
   <p:sldIdLst>
     <p:sldId id="261" r:id="rId2"/>
     <p:sldId id="270" r:id="rId3"/>
     <p:sldId id="263" r:id="rId4"/>
     <p:sldId id="271" r:id="rId5"/>
-    <p:sldId id="272" r:id="rId6"/>
-    <p:sldId id="273" r:id="rId7"/>
-    <p:sldId id="274" r:id="rId8"/>
-    <p:sldId id="275" r:id="rId9"/>
-    <p:sldId id="262" r:id="rId10"/>
+    <p:sldId id="276" r:id="rId6"/>
+    <p:sldId id="262" r:id="rId7"/>
+    <p:sldId id="275" r:id="rId8"/>
   </p:sldIdLst>
   <p:sldSz cx="12192000" cy="6858000"/>
   <p:notesSz cx="6858000" cy="9144000"/>
@@ -1236,7 +1234,7 @@
           <a:p>
             <a:r>
               <a:rPr lang="en-US" dirty="0"/>
-              <a:t>The model achieved a mean average precision or MAP of 0.74 on the test data, indicating that the model performs very well.</a:t>
+              <a:t>Now, for the test results of each model:</a:t>
             </a:r>
           </a:p>
           <a:p>
@@ -1245,8 +1243,65 @@
           <a:p>
             <a:r>
               <a:rPr lang="en-US" dirty="0"/>
-              <a:t>When we further broken the test data down into small, medium and large dogs, the model achieved MAP values of 0.61, 0.77, 0.78.  Indicating that while the model does perform worse on small dogs, it still performs quite well.</a:t>
-            </a:r>
+              <a:t>ANIMATION</a:t>
+            </a:r>
+          </a:p>
+          <a:p>
+            <a:endParaRPr lang="en-US" dirty="0"/>
+          </a:p>
+          <a:p>
+            <a:r>
+              <a:rPr lang="en-US" dirty="0"/>
+              <a:t>The Dog Extractor model achieved a mean average precision or MAP of 0.74</a:t>
+            </a:r>
+          </a:p>
+          <a:p>
+            <a:endParaRPr lang="en-US" dirty="0"/>
+          </a:p>
+          <a:p>
+            <a:r>
+              <a:rPr lang="en-US" dirty="0"/>
+              <a:t>ANIMATION</a:t>
+            </a:r>
+          </a:p>
+          <a:p>
+            <a:endParaRPr lang="en-US" dirty="0"/>
+          </a:p>
+          <a:p>
+            <a:r>
+              <a:rPr lang="en-US" dirty="0"/>
+              <a:t>The dog classification accuracy achieved a top one classification accuracy of 96%</a:t>
+            </a:r>
+          </a:p>
+          <a:p>
+            <a:endParaRPr lang="en-US" dirty="0"/>
+          </a:p>
+          <a:p>
+            <a:r>
+              <a:rPr lang="en-US" dirty="0"/>
+              <a:t>ANIMATION</a:t>
+            </a:r>
+          </a:p>
+          <a:p>
+            <a:endParaRPr lang="en-US" dirty="0"/>
+          </a:p>
+          <a:p>
+            <a:r>
+              <a:rPr lang="en-US" dirty="0"/>
+              <a:t>The dog comparator model achieved a top one classification accuracy of 89%</a:t>
+            </a:r>
+          </a:p>
+          <a:p>
+            <a:endParaRPr lang="en-US" dirty="0"/>
+          </a:p>
+          <a:p>
+            <a:r>
+              <a:rPr lang="en-US" dirty="0"/>
+              <a:t>In all three cases, the models perform very well!</a:t>
+            </a:r>
+          </a:p>
+          <a:p>
+            <a:endParaRPr lang="en-US" dirty="0"/>
           </a:p>
         </p:txBody>
       </p:sp>
@@ -1276,7 +1331,7 @@
     </p:spTree>
     <p:extLst>
       <p:ext uri="{BB962C8B-B14F-4D97-AF65-F5344CB8AC3E}">
-        <p14:creationId xmlns:p14="http://schemas.microsoft.com/office/powerpoint/2010/main" val="986342060"/>
+        <p14:creationId xmlns:p14="http://schemas.microsoft.com/office/powerpoint/2010/main" val="1486838659"/>
       </p:ext>
     </p:extLst>
   </p:cSld>
@@ -1330,7 +1385,10 @@
           <a:bodyPr/>
           <a:lstStyle/>
           <a:p>
-            <a:endParaRPr lang="en-US" dirty="0"/>
+            <a:r>
+              <a:rPr lang="en-US" dirty="0"/>
+              <a:t>Now, before discussing the results of the pipeline, Anant will start the demo of the application</a:t>
+            </a:r>
           </a:p>
         </p:txBody>
       </p:sp>
@@ -1360,7 +1418,7 @@
     </p:spTree>
     <p:extLst>
       <p:ext uri="{BB962C8B-B14F-4D97-AF65-F5344CB8AC3E}">
-        <p14:creationId xmlns:p14="http://schemas.microsoft.com/office/powerpoint/2010/main" val="612305289"/>
+        <p14:creationId xmlns:p14="http://schemas.microsoft.com/office/powerpoint/2010/main" val="2589566940"/>
       </p:ext>
     </p:extLst>
   </p:cSld>
@@ -1416,25 +1474,7 @@
           <a:p>
             <a:r>
               <a:rPr lang="en-US" dirty="0"/>
-              <a:t>For the dog comparator model, we present that results of two tests.</a:t>
-            </a:r>
-          </a:p>
-          <a:p>
-            <a:endParaRPr lang="en-US" dirty="0"/>
-          </a:p>
-          <a:p>
-            <a:r>
-              <a:rPr lang="en-US" dirty="0"/>
-              <a:t>1.) In the first test we randomly selected two images of either the same dog, or of different dogs and computed the classification accuracy.  We achieved a classification accuracy of 89%.  This was a 2% reduction in accuracy compared to previous work in this area.  However, we placed zero restrictions on the images.</a:t>
-            </a:r>
-          </a:p>
-          <a:p>
-            <a:endParaRPr lang="en-US" dirty="0"/>
-          </a:p>
-          <a:p>
-            <a:r>
-              <a:rPr lang="en-US" dirty="0"/>
-              <a:t>2.)  In the second test, we increase the difficulty such that when two images of different dogs are compared, we constrained them to be from the same breed.  In this test we achieved a decreased but still respectable accuracy of 79%</a:t>
+              <a:t>To assess the accuracy of the pipeline, we designated 500 dogs as lost and 50 dogs as found.  We then calculated the percentage of lost dogs that we returned in the top 15 matches with respect to the found dogs.  We achieved an accuracy of 98%.</a:t>
             </a:r>
           </a:p>
         </p:txBody>
@@ -1465,214 +1505,7 @@
     </p:spTree>
     <p:extLst>
       <p:ext uri="{BB962C8B-B14F-4D97-AF65-F5344CB8AC3E}">
-        <p14:creationId xmlns:p14="http://schemas.microsoft.com/office/powerpoint/2010/main" val="1200839839"/>
-      </p:ext>
-    </p:extLst>
-  </p:cSld>
-  <p:clrMapOvr>
-    <a:masterClrMapping/>
-  </p:clrMapOvr>
-</p:notes>
-</file>
-
-<file path=ppt/notesSlides/notesSlide8.xml><?xml version="1.0" encoding="utf-8"?>
-<p:notes xmlns:a="http://schemas.openxmlformats.org/drawingml/2006/main" xmlns:r="http://schemas.openxmlformats.org/officeDocument/2006/relationships" xmlns:p="http://schemas.openxmlformats.org/presentationml/2006/main">
-  <p:cSld>
-    <p:spTree>
-      <p:nvGrpSpPr>
-        <p:cNvPr id="1" name=""/>
-        <p:cNvGrpSpPr/>
-        <p:nvPr/>
-      </p:nvGrpSpPr>
-      <p:grpSpPr>
-        <a:xfrm>
-          <a:off x="0" y="0"/>
-          <a:ext cx="0" cy="0"/>
-          <a:chOff x="0" y="0"/>
-          <a:chExt cx="0" cy="0"/>
-        </a:xfrm>
-      </p:grpSpPr>
-      <p:sp>
-        <p:nvSpPr>
-          <p:cNvPr id="2" name="Slide Image Placeholder 1"/>
-          <p:cNvSpPr>
-            <a:spLocks noGrp="1" noRot="1" noChangeAspect="1"/>
-          </p:cNvSpPr>
-          <p:nvPr>
-            <p:ph type="sldImg"/>
-          </p:nvPr>
-        </p:nvSpPr>
-        <p:spPr/>
-      </p:sp>
-      <p:sp>
-        <p:nvSpPr>
-          <p:cNvPr id="3" name="Notes Placeholder 2"/>
-          <p:cNvSpPr>
-            <a:spLocks noGrp="1"/>
-          </p:cNvSpPr>
-          <p:nvPr>
-            <p:ph type="body" idx="1"/>
-          </p:nvPr>
-        </p:nvSpPr>
-        <p:spPr/>
-        <p:txBody>
-          <a:bodyPr/>
-          <a:lstStyle/>
-          <a:p>
-            <a:r>
-              <a:rPr lang="en-US" dirty="0"/>
-              <a:t>To assess the accuracy of the pipeline, we performed two tests:</a:t>
-            </a:r>
-          </a:p>
-          <a:p>
-            <a:endParaRPr lang="en-US" dirty="0"/>
-          </a:p>
-          <a:p>
-            <a:r>
-              <a:rPr lang="en-US" dirty="0"/>
-              <a:t>1.) In the first, we designated 1000 dogs as lost and 100 dogs as found.  We then calculated the percentage of lost dogs that we returned in the top 15 matches with respect to the found dogs.  We achieved an accuracy of 89%.</a:t>
-            </a:r>
-          </a:p>
-          <a:p>
-            <a:endParaRPr lang="en-US" dirty="0"/>
-          </a:p>
-          <a:p>
-            <a:endParaRPr lang="en-US" dirty="0"/>
-          </a:p>
-          <a:p>
-            <a:r>
-              <a:rPr lang="en-US" dirty="0"/>
-              <a:t>2.) In the second test we reduced the number of lost dogs to 500.  We achieved an accuracy of 98%.</a:t>
-            </a:r>
-          </a:p>
-          <a:p>
-            <a:endParaRPr lang="en-US" dirty="0"/>
-          </a:p>
-          <a:p>
-            <a:endParaRPr lang="en-US" dirty="0"/>
-          </a:p>
-          <a:p>
-            <a:r>
-              <a:rPr lang="en-US" dirty="0"/>
-              <a:t>This tells us that using a single image of a lost and found dog respectively, we can accurately match lost and found dogs together.  We suspect that in real life, the accuracy would be ~100% after we filter by location.</a:t>
-            </a:r>
-          </a:p>
-        </p:txBody>
-      </p:sp>
-      <p:sp>
-        <p:nvSpPr>
-          <p:cNvPr id="4" name="Slide Number Placeholder 3"/>
-          <p:cNvSpPr>
-            <a:spLocks noGrp="1"/>
-          </p:cNvSpPr>
-          <p:nvPr>
-            <p:ph type="sldNum" sz="quarter" idx="5"/>
-          </p:nvPr>
-        </p:nvSpPr>
-        <p:spPr/>
-        <p:txBody>
-          <a:bodyPr/>
-          <a:lstStyle/>
-          <a:p>
-            <a:fld id="{3A9FA790-C6ED-458B-80C3-E7F420A018AE}" type="slidenum">
-              <a:rPr lang="en-CA"/>
-              <a:t>8</a:t>
-            </a:fld>
-            <a:endParaRPr lang="en-US"/>
-          </a:p>
-        </p:txBody>
-      </p:sp>
-    </p:spTree>
-    <p:extLst>
-      <p:ext uri="{BB962C8B-B14F-4D97-AF65-F5344CB8AC3E}">
         <p14:creationId xmlns:p14="http://schemas.microsoft.com/office/powerpoint/2010/main" val="929351339"/>
-      </p:ext>
-    </p:extLst>
-  </p:cSld>
-  <p:clrMapOvr>
-    <a:masterClrMapping/>
-  </p:clrMapOvr>
-</p:notes>
-</file>
-
-<file path=ppt/notesSlides/notesSlide9.xml><?xml version="1.0" encoding="utf-8"?>
-<p:notes xmlns:a="http://schemas.openxmlformats.org/drawingml/2006/main" xmlns:r="http://schemas.openxmlformats.org/officeDocument/2006/relationships" xmlns:p="http://schemas.openxmlformats.org/presentationml/2006/main">
-  <p:cSld>
-    <p:spTree>
-      <p:nvGrpSpPr>
-        <p:cNvPr id="1" name=""/>
-        <p:cNvGrpSpPr/>
-        <p:nvPr/>
-      </p:nvGrpSpPr>
-      <p:grpSpPr>
-        <a:xfrm>
-          <a:off x="0" y="0"/>
-          <a:ext cx="0" cy="0"/>
-          <a:chOff x="0" y="0"/>
-          <a:chExt cx="0" cy="0"/>
-        </a:xfrm>
-      </p:grpSpPr>
-      <p:sp>
-        <p:nvSpPr>
-          <p:cNvPr id="2" name="Slide Image Placeholder 1"/>
-          <p:cNvSpPr>
-            <a:spLocks noGrp="1" noRot="1" noChangeAspect="1"/>
-          </p:cNvSpPr>
-          <p:nvPr>
-            <p:ph type="sldImg"/>
-          </p:nvPr>
-        </p:nvSpPr>
-        <p:spPr/>
-      </p:sp>
-      <p:sp>
-        <p:nvSpPr>
-          <p:cNvPr id="3" name="Notes Placeholder 2"/>
-          <p:cNvSpPr>
-            <a:spLocks noGrp="1"/>
-          </p:cNvSpPr>
-          <p:nvPr>
-            <p:ph type="body" idx="1"/>
-          </p:nvPr>
-        </p:nvSpPr>
-        <p:spPr/>
-        <p:txBody>
-          <a:bodyPr/>
-          <a:lstStyle/>
-          <a:p>
-            <a:r>
-              <a:rPr lang="en-US" dirty="0"/>
-              <a:t>This is a demo of the work done to date</a:t>
-            </a:r>
-          </a:p>
-        </p:txBody>
-      </p:sp>
-      <p:sp>
-        <p:nvSpPr>
-          <p:cNvPr id="4" name="Slide Number Placeholder 3"/>
-          <p:cNvSpPr>
-            <a:spLocks noGrp="1"/>
-          </p:cNvSpPr>
-          <p:nvPr>
-            <p:ph type="sldNum" sz="quarter" idx="5"/>
-          </p:nvPr>
-        </p:nvSpPr>
-        <p:spPr/>
-        <p:txBody>
-          <a:bodyPr/>
-          <a:lstStyle/>
-          <a:p>
-            <a:fld id="{3A9FA790-C6ED-458B-80C3-E7F420A018AE}" type="slidenum">
-              <a:rPr lang="en-CA"/>
-              <a:t>9</a:t>
-            </a:fld>
-            <a:endParaRPr lang="en-US"/>
-          </a:p>
-        </p:txBody>
-      </p:sp>
-    </p:spTree>
-    <p:extLst>
-      <p:ext uri="{BB962C8B-B14F-4D97-AF65-F5344CB8AC3E}">
-        <p14:creationId xmlns:p14="http://schemas.microsoft.com/office/powerpoint/2010/main" val="2589566940"/>
       </p:ext>
     </p:extLst>
   </p:cSld>
@@ -1811,7 +1644,7 @@
           <a:p>
             <a:fld id="{C764DE79-268F-4C1A-8933-263129D2AF90}" type="datetimeFigureOut">
               <a:rPr lang="en-US" dirty="0"/>
-              <a:t>4/8/2022</a:t>
+              <a:t>4/8/22</a:t>
             </a:fld>
             <a:endParaRPr lang="en-US"/>
           </a:p>
@@ -1979,7 +1812,7 @@
           <a:p>
             <a:fld id="{C764DE79-268F-4C1A-8933-263129D2AF90}" type="datetimeFigureOut">
               <a:rPr lang="en-US" dirty="0"/>
-              <a:t>4/8/2022</a:t>
+              <a:t>4/8/22</a:t>
             </a:fld>
             <a:endParaRPr lang="en-US"/>
           </a:p>
@@ -2157,7 +1990,7 @@
           <a:p>
             <a:fld id="{C764DE79-268F-4C1A-8933-263129D2AF90}" type="datetimeFigureOut">
               <a:rPr lang="en-US" dirty="0"/>
-              <a:t>4/8/2022</a:t>
+              <a:t>4/8/22</a:t>
             </a:fld>
             <a:endParaRPr lang="en-US"/>
           </a:p>
@@ -2325,7 +2158,7 @@
           <a:p>
             <a:fld id="{C764DE79-268F-4C1A-8933-263129D2AF90}" type="datetimeFigureOut">
               <a:rPr lang="en-US" dirty="0"/>
-              <a:t>4/8/2022</a:t>
+              <a:t>4/8/22</a:t>
             </a:fld>
             <a:endParaRPr lang="en-US"/>
           </a:p>
@@ -2570,7 +2403,7 @@
           <a:p>
             <a:fld id="{C764DE79-268F-4C1A-8933-263129D2AF90}" type="datetimeFigureOut">
               <a:rPr lang="en-US" dirty="0"/>
-              <a:t>4/8/2022</a:t>
+              <a:t>4/8/22</a:t>
             </a:fld>
             <a:endParaRPr lang="en-US"/>
           </a:p>
@@ -2799,7 +2632,7 @@
           <a:p>
             <a:fld id="{C764DE79-268F-4C1A-8933-263129D2AF90}" type="datetimeFigureOut">
               <a:rPr lang="en-US" dirty="0"/>
-              <a:t>4/8/2022</a:t>
+              <a:t>4/8/22</a:t>
             </a:fld>
             <a:endParaRPr lang="en-US"/>
           </a:p>
@@ -3163,7 +2996,7 @@
           <a:p>
             <a:fld id="{C764DE79-268F-4C1A-8933-263129D2AF90}" type="datetimeFigureOut">
               <a:rPr lang="en-US" dirty="0"/>
-              <a:t>4/8/2022</a:t>
+              <a:t>4/8/22</a:t>
             </a:fld>
             <a:endParaRPr lang="en-US"/>
           </a:p>
@@ -3280,7 +3113,7 @@
           <a:p>
             <a:fld id="{C764DE79-268F-4C1A-8933-263129D2AF90}" type="datetimeFigureOut">
               <a:rPr lang="en-US" dirty="0"/>
-              <a:t>4/8/2022</a:t>
+              <a:t>4/8/22</a:t>
             </a:fld>
             <a:endParaRPr lang="en-US"/>
           </a:p>
@@ -3375,7 +3208,7 @@
           <a:p>
             <a:fld id="{C764DE79-268F-4C1A-8933-263129D2AF90}" type="datetimeFigureOut">
               <a:rPr lang="en-US" dirty="0"/>
-              <a:t>4/8/2022</a:t>
+              <a:t>4/8/22</a:t>
             </a:fld>
             <a:endParaRPr lang="en-US"/>
           </a:p>
@@ -3650,7 +3483,7 @@
           <a:p>
             <a:fld id="{C764DE79-268F-4C1A-8933-263129D2AF90}" type="datetimeFigureOut">
               <a:rPr lang="en-US" dirty="0"/>
-              <a:t>4/8/2022</a:t>
+              <a:t>4/8/22</a:t>
             </a:fld>
             <a:endParaRPr lang="en-US"/>
           </a:p>
@@ -3902,7 +3735,7 @@
           <a:p>
             <a:fld id="{C764DE79-268F-4C1A-8933-263129D2AF90}" type="datetimeFigureOut">
               <a:rPr lang="en-US" dirty="0"/>
-              <a:t>4/8/2022</a:t>
+              <a:t>4/8/22</a:t>
             </a:fld>
             <a:endParaRPr lang="en-US"/>
           </a:p>
@@ -4113,7 +3946,7 @@
           <a:p>
             <a:fld id="{C764DE79-268F-4C1A-8933-263129D2AF90}" type="datetimeFigureOut">
               <a:rPr lang="en-US" dirty="0"/>
-              <a:t>4/8/2022</a:t>
+              <a:t>4/8/22</a:t>
             </a:fld>
             <a:endParaRPr lang="en-US"/>
           </a:p>
@@ -4676,21 +4509,7 @@
                 <a:ea typeface="+mn-lt"/>
                 <a:cs typeface="+mn-lt"/>
               </a:rPr>
-              <a:t>Aidan Vickars, </a:t>
-            </a:r>
-            <a:r>
-              <a:rPr lang="en-US" altLang="zh-CN" sz="1300" b="1" dirty="0" err="1">
-                <a:ea typeface="+mn-lt"/>
-                <a:cs typeface="+mn-lt"/>
-              </a:rPr>
-              <a:t>Rushabh</a:t>
-            </a:r>
-            <a:r>
-              <a:rPr lang="en-US" altLang="zh-CN" sz="1300" b="1" dirty="0">
-                <a:ea typeface="+mn-lt"/>
-                <a:cs typeface="+mn-lt"/>
-              </a:rPr>
-              <a:t> Kaushal, Anant </a:t>
+              <a:t>Aidan Vickars, Rishabh Kaushal, Anant </a:t>
             </a:r>
             <a:r>
               <a:rPr lang="en-US" altLang="zh-CN" sz="1300" b="1" dirty="0" err="1">
@@ -7950,7 +7769,7 @@
         <p:spPr>
           <a:xfrm>
             <a:off x="182063" y="2124629"/>
-            <a:ext cx="9807063" cy="1938992"/>
+            <a:ext cx="9807063" cy="1107996"/>
           </a:xfrm>
           <a:prstGeom prst="rect">
             <a:avLst/>
@@ -7975,7 +7794,7 @@
                 <a:ea typeface="+mn-lt"/>
                 <a:cs typeface="+mn-lt"/>
               </a:rPr>
-              <a:t>Open Images Dataset</a:t>
+              <a:t>Dog Extractor: Open Images Dataset</a:t>
             </a:r>
           </a:p>
           <a:p>
@@ -7984,54 +7803,19 @@
               <a:buChar char="•"/>
             </a:pPr>
             <a:r>
-              <a:rPr lang="en-US" altLang="zh-CN" sz="2200" dirty="0">
-                <a:ea typeface="+mn-lt"/>
-                <a:cs typeface="+mn-lt"/>
-              </a:rPr>
-              <a:t>Filtered the data to only images of  dogs</a:t>
-            </a:r>
-          </a:p>
-          <a:p>
-            <a:pPr marL="914400" lvl="1" indent="-457200">
-              <a:buFont typeface="Arial" panose="020B0604020202020204" pitchFamily="34" charset="0"/>
-              <a:buChar char="•"/>
-            </a:pPr>
-            <a:r>
-              <a:rPr lang="en-US" altLang="zh-CN" sz="2200" dirty="0">
-                <a:ea typeface="+mn-lt"/>
-                <a:cs typeface="+mn-lt"/>
-              </a:rPr>
-              <a:t>Removed any greyscale images</a:t>
-            </a:r>
-          </a:p>
-          <a:p>
-            <a:pPr marL="914400" lvl="1" indent="-457200">
-              <a:buFont typeface="Arial" panose="020B0604020202020204" pitchFamily="34" charset="0"/>
-              <a:buChar char="•"/>
-            </a:pPr>
-            <a:r>
-              <a:rPr lang="en-US" altLang="zh-CN" sz="2200" dirty="0">
-                <a:ea typeface="+mn-lt"/>
-                <a:cs typeface="+mn-lt"/>
-              </a:rPr>
-              <a:t>Converted all other images to RGB</a:t>
-            </a:r>
-          </a:p>
-          <a:p>
-            <a:pPr marL="914400" lvl="1" indent="-457200">
-              <a:buFont typeface="Arial" panose="020B0604020202020204" pitchFamily="34" charset="0"/>
-              <a:buChar char="•"/>
-            </a:pPr>
-            <a:endParaRPr lang="zh-CN" sz="3200" dirty="0"/>
-          </a:p>
-        </p:txBody>
-      </p:sp>
-      <p:sp>
-        <p:nvSpPr>
-          <p:cNvPr id="9" name="文本框 4">
+              <a:rPr lang="en-CA" altLang="zh-CN" sz="2200" dirty="0"/>
+              <a:t>Contained approximately ~10 000 images of different dogs with annotated bounding boxes.</a:t>
+            </a:r>
+            <a:endParaRPr lang="zh-CN" sz="2200" dirty="0"/>
+          </a:p>
+        </p:txBody>
+      </p:sp>
+      <p:sp>
+        <p:nvSpPr>
+          <p:cNvPr id="10" name="文本框 4">
             <a:extLst>
               <a:ext uri="{FF2B5EF4-FFF2-40B4-BE49-F238E27FC236}">
-                <a16:creationId xmlns:a16="http://schemas.microsoft.com/office/drawing/2014/main" id="{78337AF6-2134-48E1-A096-7EFD3DBF74EC}"/>
+                <a16:creationId xmlns:a16="http://schemas.microsoft.com/office/drawing/2014/main" id="{1C6E6542-ABA5-4393-8F32-16C66F7F7436}"/>
               </a:ext>
             </a:extLst>
           </p:cNvPr>
@@ -8040,8 +7824,8 @@
         </p:nvSpPr>
         <p:spPr>
           <a:xfrm>
-            <a:off x="182063" y="3037171"/>
-            <a:ext cx="9807063" cy="430887"/>
+            <a:off x="182063" y="3342738"/>
+            <a:ext cx="9807063" cy="769441"/>
           </a:xfrm>
           <a:prstGeom prst="rect">
             <a:avLst/>
@@ -8061,19 +7845,35 @@
               <a:buFont typeface="Arial" panose="020B0604020202020204" pitchFamily="34" charset="0"/>
               <a:buChar char="•"/>
             </a:pPr>
-            <a:endParaRPr lang="en-US" altLang="zh-CN" sz="2200" dirty="0">
-              <a:ea typeface="+mn-lt"/>
-              <a:cs typeface="+mn-lt"/>
-            </a:endParaRPr>
-          </a:p>
-        </p:txBody>
-      </p:sp>
-      <p:sp>
-        <p:nvSpPr>
-          <p:cNvPr id="10" name="文本框 4">
+            <a:r>
+              <a:rPr lang="en-US" altLang="zh-CN" sz="2200" dirty="0">
+                <a:ea typeface="+mn-lt"/>
+                <a:cs typeface="+mn-lt"/>
+              </a:rPr>
+              <a:t>Dog Classifier: Stanford Dogs Dataset</a:t>
+            </a:r>
+          </a:p>
+          <a:p>
+            <a:pPr marL="914400" lvl="1" indent="-457200">
+              <a:buFont typeface="Arial" panose="020B0604020202020204" pitchFamily="34" charset="0"/>
+              <a:buChar char="•"/>
+            </a:pPr>
+            <a:r>
+              <a:rPr lang="en-US" altLang="zh-CN" sz="2200" dirty="0">
+                <a:ea typeface="+mn-lt"/>
+                <a:cs typeface="+mn-lt"/>
+              </a:rPr>
+              <a:t>Contained ~20 000 images with 120 different breeds from around the world.</a:t>
+            </a:r>
+          </a:p>
+        </p:txBody>
+      </p:sp>
+      <p:sp>
+        <p:nvSpPr>
+          <p:cNvPr id="13" name="文本框 4">
             <a:extLst>
               <a:ext uri="{FF2B5EF4-FFF2-40B4-BE49-F238E27FC236}">
-                <a16:creationId xmlns:a16="http://schemas.microsoft.com/office/drawing/2014/main" id="{1C6E6542-ABA5-4393-8F32-16C66F7F7436}"/>
+                <a16:creationId xmlns:a16="http://schemas.microsoft.com/office/drawing/2014/main" id="{601D1792-7912-4F35-A34C-54B6EBC9245D}"/>
               </a:ext>
             </a:extLst>
           </p:cNvPr>
@@ -8082,8 +7882,8 @@
         </p:nvSpPr>
         <p:spPr>
           <a:xfrm>
-            <a:off x="182062" y="5343978"/>
-            <a:ext cx="9807063" cy="430887"/>
+            <a:off x="182063" y="4312687"/>
+            <a:ext cx="9807063" cy="1107996"/>
           </a:xfrm>
           <a:prstGeom prst="rect">
             <a:avLst/>
@@ -8108,52 +7908,21 @@
                 <a:ea typeface="+mn-lt"/>
                 <a:cs typeface="+mn-lt"/>
               </a:rPr>
-              <a:t>Stanford Dogs Dataset</a:t>
-            </a:r>
-          </a:p>
-        </p:txBody>
-      </p:sp>
-      <p:sp>
-        <p:nvSpPr>
-          <p:cNvPr id="13" name="文本框 4">
-            <a:extLst>
-              <a:ext uri="{FF2B5EF4-FFF2-40B4-BE49-F238E27FC236}">
-                <a16:creationId xmlns:a16="http://schemas.microsoft.com/office/drawing/2014/main" id="{601D1792-7912-4F35-A34C-54B6EBC9245D}"/>
-              </a:ext>
-            </a:extLst>
-          </p:cNvPr>
-          <p:cNvSpPr txBox="1"/>
-          <p:nvPr/>
-        </p:nvSpPr>
-        <p:spPr>
-          <a:xfrm>
-            <a:off x="182062" y="3497318"/>
-            <a:ext cx="9807063" cy="1785104"/>
-          </a:xfrm>
-          <a:prstGeom prst="rect">
-            <a:avLst/>
-          </a:prstGeom>
-          <a:noFill/>
-        </p:spPr>
-        <p:txBody>
-          <a:bodyPr rot="0" spcFirstLastPara="0" vertOverflow="overflow" horzOverflow="overflow" vert="horz" wrap="square" lIns="91440" tIns="45720" rIns="91440" bIns="45720" numCol="1" spcCol="0" rtlCol="0" fromWordArt="0" anchor="t" anchorCtr="0" forceAA="0" compatLnSpc="1">
-            <a:prstTxWarp prst="textNoShape">
-              <a:avLst/>
-            </a:prstTxWarp>
-            <a:spAutoFit/>
-          </a:bodyPr>
-          <a:lstStyle/>
-          <a:p>
-            <a:pPr marL="457200" indent="-457200">
-              <a:buFont typeface="Arial" panose="020B0604020202020204" pitchFamily="34" charset="0"/>
-              <a:buChar char="•"/>
-            </a:pPr>
+              <a:t>Dog Comparator: </a:t>
+            </a:r>
+            <a:r>
+              <a:rPr lang="en-US" altLang="zh-CN" sz="2200" dirty="0" err="1">
+                <a:ea typeface="+mn-lt"/>
+                <a:cs typeface="+mn-lt"/>
+              </a:rPr>
+              <a:t>PetFinder.com</a:t>
+            </a:r>
             <a:r>
               <a:rPr lang="en-US" altLang="zh-CN" sz="2200" dirty="0">
                 <a:ea typeface="+mn-lt"/>
                 <a:cs typeface="+mn-lt"/>
               </a:rPr>
-              <a:t>PetFinder.com Dataset</a:t>
+              <a:t> Dataset</a:t>
             </a:r>
           </a:p>
           <a:p>
@@ -8166,33 +7935,21 @@
                 <a:ea typeface="+mn-lt"/>
                 <a:cs typeface="+mn-lt"/>
               </a:rPr>
-              <a:t>Scraped multiple images for thousands of dogs from petfinder.com</a:t>
-            </a:r>
-          </a:p>
-          <a:p>
-            <a:pPr marL="914400" lvl="1" indent="-457200">
-              <a:buFont typeface="Arial" panose="020B0604020202020204" pitchFamily="34" charset="0"/>
-              <a:buChar char="•"/>
-            </a:pPr>
+              <a:t>Scraped multiple images for ~8000 dogs from </a:t>
+            </a:r>
+            <a:r>
+              <a:rPr lang="en-US" altLang="zh-CN" sz="2200" dirty="0" err="1">
+                <a:ea typeface="+mn-lt"/>
+                <a:cs typeface="+mn-lt"/>
+              </a:rPr>
+              <a:t>petfinder.com</a:t>
+            </a:r>
             <a:r>
               <a:rPr lang="en-US" altLang="zh-CN" sz="2200" dirty="0">
                 <a:ea typeface="+mn-lt"/>
                 <a:cs typeface="+mn-lt"/>
               </a:rPr>
-              <a:t>Cleaned the dataset by applying the Dog Extractor model to remove images that (1) did not contain a dog and (2) contained multiple dogs</a:t>
-            </a:r>
-          </a:p>
-          <a:p>
-            <a:pPr marL="914400" lvl="1" indent="-457200">
-              <a:buFont typeface="Arial" panose="020B0604020202020204" pitchFamily="34" charset="0"/>
-              <a:buChar char="•"/>
-            </a:pPr>
-            <a:r>
-              <a:rPr lang="en-US" altLang="zh-CN" sz="2200" dirty="0">
-                <a:ea typeface="+mn-lt"/>
-                <a:cs typeface="+mn-lt"/>
-              </a:rPr>
-              <a:t>Standardized the dog breeds in the dataset</a:t>
+              <a:t> with characteristics such as breed, location, age.</a:t>
             </a:r>
           </a:p>
         </p:txBody>
@@ -8363,7 +8120,7 @@
                 <a:ea typeface="+mn-lt"/>
                 <a:cs typeface="+mn-lt"/>
               </a:rPr>
-              <a:t>Results</a:t>
+              <a:t>Test Results</a:t>
             </a:r>
             <a:endParaRPr lang="zh-CN" sz="4800" b="1" dirty="0">
               <a:solidFill>
@@ -8375,180 +8132,12 @@
           </a:p>
         </p:txBody>
       </p:sp>
-      <p:sp>
-        <p:nvSpPr>
-          <p:cNvPr id="5" name="文本框 4">
-            <a:extLst>
-              <a:ext uri="{FF2B5EF4-FFF2-40B4-BE49-F238E27FC236}">
-                <a16:creationId xmlns:a16="http://schemas.microsoft.com/office/drawing/2014/main" id="{68B1BA4B-3F2D-413D-B877-61D78EEBE4EB}"/>
-              </a:ext>
-            </a:extLst>
-          </p:cNvPr>
-          <p:cNvSpPr txBox="1"/>
-          <p:nvPr/>
-        </p:nvSpPr>
-        <p:spPr>
-          <a:xfrm>
-            <a:off x="1955" y="1510594"/>
-            <a:ext cx="9807063" cy="584775"/>
-          </a:xfrm>
-          <a:prstGeom prst="rect">
-            <a:avLst/>
-          </a:prstGeom>
-          <a:noFill/>
-        </p:spPr>
-        <p:txBody>
-          <a:bodyPr rot="0" spcFirstLastPara="0" vertOverflow="overflow" horzOverflow="overflow" vert="horz" wrap="square" lIns="91440" tIns="45720" rIns="91440" bIns="45720" numCol="1" spcCol="0" rtlCol="0" fromWordArt="0" anchor="t" anchorCtr="0" forceAA="0" compatLnSpc="1">
-            <a:prstTxWarp prst="textNoShape">
-              <a:avLst/>
-            </a:prstTxWarp>
-            <a:spAutoFit/>
-          </a:bodyPr>
-          <a:lstStyle/>
-          <a:p>
-            <a:r>
-              <a:rPr lang="en-US" altLang="zh-CN" sz="3200" dirty="0">
-                <a:ea typeface="+mn-lt"/>
-                <a:cs typeface="+mn-lt"/>
-              </a:rPr>
-              <a:t>Dog Extractor Model:</a:t>
-            </a:r>
-            <a:endParaRPr lang="zh-CN" sz="3200" dirty="0"/>
-          </a:p>
-        </p:txBody>
-      </p:sp>
-      <p:sp>
-        <p:nvSpPr>
-          <p:cNvPr id="8" name="文本框 4">
-            <a:extLst>
-              <a:ext uri="{FF2B5EF4-FFF2-40B4-BE49-F238E27FC236}">
-                <a16:creationId xmlns:a16="http://schemas.microsoft.com/office/drawing/2014/main" id="{206560DF-034B-468C-88CA-4C90C51EBFA9}"/>
-              </a:ext>
-            </a:extLst>
-          </p:cNvPr>
-          <p:cNvSpPr txBox="1"/>
-          <p:nvPr/>
-        </p:nvSpPr>
-        <p:spPr>
-          <a:xfrm>
-            <a:off x="182063" y="2124629"/>
-            <a:ext cx="9807063" cy="430887"/>
-          </a:xfrm>
-          <a:prstGeom prst="rect">
-            <a:avLst/>
-          </a:prstGeom>
-          <a:noFill/>
-        </p:spPr>
-        <p:txBody>
-          <a:bodyPr rot="0" spcFirstLastPara="0" vertOverflow="overflow" horzOverflow="overflow" vert="horz" wrap="square" lIns="91440" tIns="45720" rIns="91440" bIns="45720" numCol="1" spcCol="0" rtlCol="0" fromWordArt="0" anchor="t" anchorCtr="0" forceAA="0" compatLnSpc="1">
-            <a:prstTxWarp prst="textNoShape">
-              <a:avLst/>
-            </a:prstTxWarp>
-            <a:spAutoFit/>
-          </a:bodyPr>
-          <a:lstStyle/>
-          <a:p>
-            <a:pPr marL="457200" indent="-457200">
-              <a:buFont typeface="Arial" panose="020B0604020202020204" pitchFamily="34" charset="0"/>
-              <a:buChar char="•"/>
-            </a:pPr>
-            <a:r>
-              <a:rPr lang="en-US" altLang="zh-CN" sz="2200" dirty="0">
-                <a:ea typeface="+mn-lt"/>
-                <a:cs typeface="+mn-lt"/>
-              </a:rPr>
-              <a:t>Achieved MAP of 0.74 on test data</a:t>
-            </a:r>
-          </a:p>
-        </p:txBody>
-      </p:sp>
-      <p:sp>
-        <p:nvSpPr>
-          <p:cNvPr id="10" name="文本框 4">
-            <a:extLst>
-              <a:ext uri="{FF2B5EF4-FFF2-40B4-BE49-F238E27FC236}">
-                <a16:creationId xmlns:a16="http://schemas.microsoft.com/office/drawing/2014/main" id="{1C6E6542-ABA5-4393-8F32-16C66F7F7436}"/>
-              </a:ext>
-            </a:extLst>
-          </p:cNvPr>
-          <p:cNvSpPr txBox="1"/>
-          <p:nvPr/>
-        </p:nvSpPr>
-        <p:spPr>
-          <a:xfrm>
-            <a:off x="255750" y="4139296"/>
-            <a:ext cx="9807063" cy="769441"/>
-          </a:xfrm>
-          <a:prstGeom prst="rect">
-            <a:avLst/>
-          </a:prstGeom>
-          <a:noFill/>
-        </p:spPr>
-        <p:txBody>
-          <a:bodyPr rot="0" spcFirstLastPara="0" vertOverflow="overflow" horzOverflow="overflow" vert="horz" wrap="square" lIns="91440" tIns="45720" rIns="91440" bIns="45720" numCol="1" spcCol="0" rtlCol="0" fromWordArt="0" anchor="t" anchorCtr="0" forceAA="0" compatLnSpc="1">
-            <a:prstTxWarp prst="textNoShape">
-              <a:avLst/>
-            </a:prstTxWarp>
-            <a:spAutoFit/>
-          </a:bodyPr>
-          <a:lstStyle/>
-          <a:p>
-            <a:pPr marL="457200" indent="-457200">
-              <a:buFont typeface="Arial" panose="020B0604020202020204" pitchFamily="34" charset="0"/>
-              <a:buChar char="•"/>
-            </a:pPr>
-            <a:r>
-              <a:rPr lang="en-US" altLang="zh-CN" sz="2200" dirty="0">
-                <a:ea typeface="+mn-lt"/>
-                <a:cs typeface="+mn-lt"/>
-              </a:rPr>
-              <a:t>Achieved MAP of 0.61, 0.77, and 0.78 on small, medium and large dogs respectively</a:t>
-            </a:r>
-            <a:endParaRPr lang="zh-CN" sz="3200" dirty="0"/>
-          </a:p>
-        </p:txBody>
-      </p:sp>
       <p:pic>
         <p:nvPicPr>
-          <p:cNvPr id="12" name="Picture 11" descr="A picture containing person, dog, indoor&#10;&#10;Description automatically generated">
+          <p:cNvPr id="8" name="Picture 7" descr="Icon&#10;&#10;Description automatically generated">
             <a:extLst>
               <a:ext uri="{FF2B5EF4-FFF2-40B4-BE49-F238E27FC236}">
-                <a16:creationId xmlns:a16="http://schemas.microsoft.com/office/drawing/2014/main" id="{C8DDC027-C554-416A-89AB-7E3F97A404F7}"/>
-              </a:ext>
-            </a:extLst>
-          </p:cNvPr>
-          <p:cNvPicPr>
-            <a:picLocks noChangeAspect="1"/>
-          </p:cNvPicPr>
-          <p:nvPr/>
-        </p:nvPicPr>
-        <p:blipFill rotWithShape="1">
-          <a:blip r:embed="rId4">
-            <a:extLst>
-              <a:ext uri="{28A0092B-C50C-407E-A947-70E740481C1C}">
-                <a14:useLocalDpi xmlns:a14="http://schemas.microsoft.com/office/drawing/2010/main" val="0"/>
-              </a:ext>
-            </a:extLst>
-          </a:blip>
-          <a:srcRect l="12677" r="6337" b="14582"/>
-          <a:stretch/>
-        </p:blipFill>
-        <p:spPr>
-          <a:xfrm>
-            <a:off x="5638645" y="2927716"/>
-            <a:ext cx="730800" cy="781754"/>
-          </a:xfrm>
-          <a:prstGeom prst="rect">
-            <a:avLst/>
-          </a:prstGeom>
-        </p:spPr>
-      </p:pic>
-      <p:pic>
-        <p:nvPicPr>
-          <p:cNvPr id="14" name="Picture 13" descr="A picture containing person, dog, indoor&#10;&#10;Description automatically generated">
-            <a:extLst>
-              <a:ext uri="{FF2B5EF4-FFF2-40B4-BE49-F238E27FC236}">
-                <a16:creationId xmlns:a16="http://schemas.microsoft.com/office/drawing/2014/main" id="{14A037C4-F2F7-4780-B1B9-6E6D2A191F17}"/>
+                <a16:creationId xmlns:a16="http://schemas.microsoft.com/office/drawing/2014/main" id="{68E57A9A-EDC7-0049-A8ED-E73880539BF1}"/>
               </a:ext>
             </a:extLst>
           </p:cNvPr>
@@ -8571,8 +8160,8 @@
         </p:blipFill>
         <p:spPr>
           <a:xfrm>
-            <a:off x="4417214" y="3230845"/>
-            <a:ext cx="810000" cy="810000"/>
+            <a:off x="1649715" y="2798328"/>
+            <a:ext cx="1110894" cy="1110894"/>
           </a:xfrm>
           <a:prstGeom prst="rect">
             <a:avLst/>
@@ -8581,29 +8170,111 @@
       </p:pic>
       <p:sp>
         <p:nvSpPr>
-          <p:cNvPr id="15" name="Rectangle 14">
+          <p:cNvPr id="9" name="TextBox 8">
             <a:extLst>
               <a:ext uri="{FF2B5EF4-FFF2-40B4-BE49-F238E27FC236}">
-                <a16:creationId xmlns:a16="http://schemas.microsoft.com/office/drawing/2014/main" id="{0F5625E4-561B-49D9-975F-F7454FC35B72}"/>
+                <a16:creationId xmlns:a16="http://schemas.microsoft.com/office/drawing/2014/main" id="{AC96B5E4-D2CF-3D41-B0C4-FF32069310AF}"/>
               </a:ext>
             </a:extLst>
           </p:cNvPr>
-          <p:cNvSpPr/>
+          <p:cNvSpPr txBox="1"/>
           <p:nvPr/>
         </p:nvSpPr>
         <p:spPr>
           <a:xfrm>
-            <a:off x="4548923" y="3275944"/>
-            <a:ext cx="622744" cy="672519"/>
+            <a:off x="888130" y="2272220"/>
+            <a:ext cx="3316031" cy="584775"/>
           </a:xfrm>
           <a:prstGeom prst="rect">
             <a:avLst/>
           </a:prstGeom>
           <a:noFill/>
-          <a:ln>
+        </p:spPr>
+        <p:txBody>
+          <a:bodyPr wrap="square" rtlCol="0">
+            <a:spAutoFit/>
+          </a:bodyPr>
+          <a:lstStyle/>
+          <a:p>
+            <a:r>
+              <a:rPr lang="en-US" sz="3200" b="1" dirty="0"/>
+              <a:t>DOG EXTRACTOR</a:t>
+            </a:r>
+            <a:endParaRPr lang="en-CA" sz="3200" b="1" dirty="0"/>
+          </a:p>
+        </p:txBody>
+      </p:sp>
+      <p:cxnSp>
+        <p:nvCxnSpPr>
+          <p:cNvPr id="27" name="Straight Arrow Connector 26">
+            <a:extLst>
+              <a:ext uri="{FF2B5EF4-FFF2-40B4-BE49-F238E27FC236}">
+                <a16:creationId xmlns:a16="http://schemas.microsoft.com/office/drawing/2014/main" id="{FB91292A-3F42-3A41-AF30-1BA523B5C744}"/>
+              </a:ext>
+            </a:extLst>
+          </p:cNvPr>
+          <p:cNvCxnSpPr>
+            <a:cxnSpLocks/>
+          </p:cNvCxnSpPr>
+          <p:nvPr/>
+        </p:nvCxnSpPr>
+        <p:spPr>
+          <a:xfrm>
+            <a:off x="4204161" y="3752156"/>
+            <a:ext cx="360000" cy="0"/>
+          </a:xfrm>
+          <a:prstGeom prst="straightConnector1">
+            <a:avLst/>
+          </a:prstGeom>
+          <a:ln w="57150">
+            <a:tailEnd type="triangle"/>
+          </a:ln>
+        </p:spPr>
+        <p:style>
+          <a:lnRef idx="1">
+            <a:schemeClr val="dk1"/>
+          </a:lnRef>
+          <a:fillRef idx="0">
+            <a:schemeClr val="dk1"/>
+          </a:fillRef>
+          <a:effectRef idx="0">
+            <a:schemeClr val="dk1"/>
+          </a:effectRef>
+          <a:fontRef idx="minor">
+            <a:schemeClr val="tx1"/>
+          </a:fontRef>
+        </p:style>
+      </p:cxnSp>
+      <p:sp>
+        <p:nvSpPr>
+          <p:cNvPr id="28" name="Rectangle: Rounded Corners 240">
+            <a:extLst>
+              <a:ext uri="{FF2B5EF4-FFF2-40B4-BE49-F238E27FC236}">
+                <a16:creationId xmlns:a16="http://schemas.microsoft.com/office/drawing/2014/main" id="{F11E8561-D06F-A34D-90ED-65A8485B866F}"/>
+              </a:ext>
+            </a:extLst>
+          </p:cNvPr>
+          <p:cNvSpPr/>
+          <p:nvPr/>
+        </p:nvSpPr>
+        <p:spPr>
+          <a:xfrm>
+            <a:off x="743308" y="2238630"/>
+            <a:ext cx="3240000" cy="3240000"/>
+          </a:xfrm>
+          <a:prstGeom prst="roundRect">
+            <a:avLst>
+              <a:gd name="adj" fmla="val 7861"/>
+            </a:avLst>
+          </a:prstGeom>
+          <a:noFill/>
+          <a:ln w="12700">
             <a:solidFill>
-              <a:srgbClr val="FF0000"/>
+              <a:schemeClr val="bg1">
+                <a:lumMod val="75000"/>
+              </a:schemeClr>
             </a:solidFill>
+            <a:prstDash val="dash"/>
           </a:ln>
         </p:spPr>
         <p:style>
@@ -8633,10 +8304,10 @@
       </p:sp>
       <p:cxnSp>
         <p:nvCxnSpPr>
-          <p:cNvPr id="16" name="Straight Connector 15">
+          <p:cNvPr id="31" name="Straight Arrow Connector 30">
             <a:extLst>
               <a:ext uri="{FF2B5EF4-FFF2-40B4-BE49-F238E27FC236}">
-                <a16:creationId xmlns:a16="http://schemas.microsoft.com/office/drawing/2014/main" id="{BB06730A-28E5-4D68-B328-687406EF40D7}"/>
+                <a16:creationId xmlns:a16="http://schemas.microsoft.com/office/drawing/2014/main" id="{AF91282B-E36C-6844-AF19-DD4DEAB523E2}"/>
               </a:ext>
             </a:extLst>
           </p:cNvPr>
@@ -8647,181 +8318,497 @@
         </p:nvCxnSpPr>
         <p:spPr>
           <a:xfrm flipV="1">
-            <a:off x="4548922" y="3715959"/>
-            <a:ext cx="1089723" cy="227942"/>
-          </a:xfrm>
-          <a:prstGeom prst="line">
+            <a:off x="7911474" y="3851450"/>
+            <a:ext cx="360000" cy="3544"/>
+          </a:xfrm>
+          <a:prstGeom prst="straightConnector1">
             <a:avLst/>
           </a:prstGeom>
-          <a:ln w="9525">
-            <a:solidFill>
-              <a:srgbClr val="FF0000"/>
-            </a:solidFill>
-            <a:prstDash val="dashDot"/>
+          <a:ln w="57150">
+            <a:tailEnd type="triangle"/>
           </a:ln>
         </p:spPr>
         <p:style>
           <a:lnRef idx="1">
-            <a:schemeClr val="accent1"/>
+            <a:schemeClr val="dk1"/>
           </a:lnRef>
           <a:fillRef idx="0">
+            <a:schemeClr val="dk1"/>
+          </a:fillRef>
+          <a:effectRef idx="0">
+            <a:schemeClr val="dk1"/>
+          </a:effectRef>
+          <a:fontRef idx="minor">
+            <a:schemeClr val="tx1"/>
+          </a:fontRef>
+        </p:style>
+      </p:cxnSp>
+      <p:sp>
+        <p:nvSpPr>
+          <p:cNvPr id="35" name="Rectangle: Rounded Corners 256">
+            <a:extLst>
+              <a:ext uri="{FF2B5EF4-FFF2-40B4-BE49-F238E27FC236}">
+                <a16:creationId xmlns:a16="http://schemas.microsoft.com/office/drawing/2014/main" id="{EF398FC1-4D74-5D4F-935D-08103929074F}"/>
+              </a:ext>
+            </a:extLst>
+          </p:cNvPr>
+          <p:cNvSpPr/>
+          <p:nvPr/>
+        </p:nvSpPr>
+        <p:spPr>
+          <a:xfrm>
+            <a:off x="408215" y="1829021"/>
+            <a:ext cx="11585618" cy="4408378"/>
+          </a:xfrm>
+          <a:prstGeom prst="roundRect">
+            <a:avLst>
+              <a:gd name="adj" fmla="val 3867"/>
+            </a:avLst>
+          </a:prstGeom>
+          <a:noFill/>
+          <a:ln w="57150">
+            <a:solidFill>
+              <a:schemeClr val="tx1"/>
+            </a:solidFill>
+          </a:ln>
+        </p:spPr>
+        <p:style>
+          <a:lnRef idx="2">
+            <a:schemeClr val="accent1">
+              <a:shade val="50000"/>
+            </a:schemeClr>
+          </a:lnRef>
+          <a:fillRef idx="1">
             <a:schemeClr val="accent1"/>
           </a:fillRef>
           <a:effectRef idx="0">
             <a:schemeClr val="accent1"/>
           </a:effectRef>
           <a:fontRef idx="minor">
-            <a:schemeClr val="tx1"/>
+            <a:schemeClr val="lt1"/>
           </a:fontRef>
         </p:style>
-      </p:cxnSp>
-      <p:cxnSp>
-        <p:nvCxnSpPr>
-          <p:cNvPr id="17" name="Straight Connector 16">
+        <p:txBody>
+          <a:bodyPr rtlCol="0" anchor="ctr"/>
+          <a:lstStyle/>
+          <a:p>
+            <a:pPr algn="ctr"/>
+            <a:endParaRPr lang="en-CA"/>
+          </a:p>
+        </p:txBody>
+      </p:sp>
+      <p:sp>
+        <p:nvSpPr>
+          <p:cNvPr id="36" name="Rectangle: Rounded Corners 240">
             <a:extLst>
               <a:ext uri="{FF2B5EF4-FFF2-40B4-BE49-F238E27FC236}">
-                <a16:creationId xmlns:a16="http://schemas.microsoft.com/office/drawing/2014/main" id="{2FAFAEA1-5150-4CBD-ABDC-5974169D8B22}"/>
+                <a16:creationId xmlns:a16="http://schemas.microsoft.com/office/drawing/2014/main" id="{3E1E3670-814A-4147-BBC9-04B70504FF40}"/>
               </a:ext>
             </a:extLst>
           </p:cNvPr>
-          <p:cNvCxnSpPr>
-            <a:cxnSpLocks/>
-          </p:cNvCxnSpPr>
+          <p:cNvSpPr/>
           <p:nvPr/>
-        </p:nvCxnSpPr>
-        <p:spPr>
-          <a:xfrm flipV="1">
-            <a:off x="5166200" y="3715959"/>
-            <a:ext cx="1203245" cy="231589"/>
-          </a:xfrm>
-          <a:prstGeom prst="line">
-            <a:avLst/>
+        </p:nvSpPr>
+        <p:spPr>
+          <a:xfrm>
+            <a:off x="4744893" y="2238630"/>
+            <a:ext cx="3240000" cy="3240000"/>
+          </a:xfrm>
+          <a:prstGeom prst="roundRect">
+            <a:avLst>
+              <a:gd name="adj" fmla="val 7861"/>
+            </a:avLst>
           </a:prstGeom>
-          <a:ln w="9525">
+          <a:noFill/>
+          <a:ln w="12700">
             <a:solidFill>
-              <a:srgbClr val="FF0000"/>
+              <a:schemeClr val="bg1">
+                <a:lumMod val="75000"/>
+              </a:schemeClr>
             </a:solidFill>
-            <a:prstDash val="dashDot"/>
+            <a:prstDash val="dash"/>
           </a:ln>
         </p:spPr>
         <p:style>
-          <a:lnRef idx="1">
-            <a:schemeClr val="accent1"/>
+          <a:lnRef idx="2">
+            <a:schemeClr val="accent1">
+              <a:shade val="50000"/>
+            </a:schemeClr>
           </a:lnRef>
-          <a:fillRef idx="0">
+          <a:fillRef idx="1">
             <a:schemeClr val="accent1"/>
           </a:fillRef>
           <a:effectRef idx="0">
             <a:schemeClr val="accent1"/>
           </a:effectRef>
           <a:fontRef idx="minor">
-            <a:schemeClr val="tx1"/>
+            <a:schemeClr val="lt1"/>
           </a:fontRef>
         </p:style>
-      </p:cxnSp>
-      <p:cxnSp>
-        <p:nvCxnSpPr>
-          <p:cNvPr id="18" name="Straight Connector 17">
+        <p:txBody>
+          <a:bodyPr rtlCol="0" anchor="ctr"/>
+          <a:lstStyle/>
+          <a:p>
+            <a:pPr algn="ctr"/>
+            <a:endParaRPr lang="en-CA"/>
+          </a:p>
+        </p:txBody>
+      </p:sp>
+      <p:sp>
+        <p:nvSpPr>
+          <p:cNvPr id="37" name="Rectangle: Rounded Corners 240">
             <a:extLst>
               <a:ext uri="{FF2B5EF4-FFF2-40B4-BE49-F238E27FC236}">
-                <a16:creationId xmlns:a16="http://schemas.microsoft.com/office/drawing/2014/main" id="{1844267B-CADA-410B-A074-7A89BA44736F}"/>
+                <a16:creationId xmlns:a16="http://schemas.microsoft.com/office/drawing/2014/main" id="{CDE103A6-A94F-F94A-BEF9-C7F485609B86}"/>
               </a:ext>
             </a:extLst>
           </p:cNvPr>
-          <p:cNvCxnSpPr>
-            <a:cxnSpLocks/>
-          </p:cNvCxnSpPr>
+          <p:cNvSpPr/>
           <p:nvPr/>
-        </p:nvCxnSpPr>
-        <p:spPr>
-          <a:xfrm flipV="1">
-            <a:off x="5159282" y="2947674"/>
-            <a:ext cx="1176560" cy="328270"/>
-          </a:xfrm>
-          <a:prstGeom prst="line">
-            <a:avLst/>
+        </p:nvSpPr>
+        <p:spPr>
+          <a:xfrm>
+            <a:off x="8197887" y="2289222"/>
+            <a:ext cx="3240000" cy="3240000"/>
+          </a:xfrm>
+          <a:prstGeom prst="roundRect">
+            <a:avLst>
+              <a:gd name="adj" fmla="val 7861"/>
+            </a:avLst>
           </a:prstGeom>
-          <a:ln w="9525">
+          <a:noFill/>
+          <a:ln w="12700">
             <a:solidFill>
-              <a:srgbClr val="FF0000"/>
+              <a:schemeClr val="bg1">
+                <a:lumMod val="75000"/>
+              </a:schemeClr>
             </a:solidFill>
-            <a:prstDash val="dashDot"/>
+            <a:prstDash val="dash"/>
           </a:ln>
         </p:spPr>
         <p:style>
-          <a:lnRef idx="1">
-            <a:schemeClr val="accent1"/>
+          <a:lnRef idx="2">
+            <a:schemeClr val="accent1">
+              <a:shade val="50000"/>
+            </a:schemeClr>
           </a:lnRef>
-          <a:fillRef idx="0">
+          <a:fillRef idx="1">
             <a:schemeClr val="accent1"/>
           </a:fillRef>
           <a:effectRef idx="0">
             <a:schemeClr val="accent1"/>
           </a:effectRef>
           <a:fontRef idx="minor">
-            <a:schemeClr val="tx1"/>
+            <a:schemeClr val="lt1"/>
           </a:fontRef>
         </p:style>
-      </p:cxnSp>
-      <p:cxnSp>
-        <p:nvCxnSpPr>
-          <p:cNvPr id="19" name="Straight Connector 18">
+        <p:txBody>
+          <a:bodyPr rtlCol="0" anchor="ctr"/>
+          <a:lstStyle/>
+          <a:p>
+            <a:pPr algn="ctr"/>
+            <a:endParaRPr lang="en-CA"/>
+          </a:p>
+        </p:txBody>
+      </p:sp>
+      <p:pic>
+        <p:nvPicPr>
+          <p:cNvPr id="38" name="Picture 37" descr="Icon&#10;&#10;Description automatically generated">
             <a:extLst>
               <a:ext uri="{FF2B5EF4-FFF2-40B4-BE49-F238E27FC236}">
-                <a16:creationId xmlns:a16="http://schemas.microsoft.com/office/drawing/2014/main" id="{C0A07ACA-8BFC-4D23-AA64-1FAD6F04A5A0}"/>
+                <a16:creationId xmlns:a16="http://schemas.microsoft.com/office/drawing/2014/main" id="{8081BC68-A181-3943-85BF-5A41619724AB}"/>
               </a:ext>
             </a:extLst>
           </p:cNvPr>
-          <p:cNvCxnSpPr>
-            <a:cxnSpLocks/>
-          </p:cNvCxnSpPr>
+          <p:cNvPicPr>
+            <a:picLocks noChangeAspect="1"/>
+          </p:cNvPicPr>
           <p:nvPr/>
-        </p:nvCxnSpPr>
-        <p:spPr>
-          <a:xfrm flipV="1">
-            <a:off x="4548922" y="2918738"/>
-            <a:ext cx="1089723" cy="367395"/>
-          </a:xfrm>
-          <a:prstGeom prst="line">
+        </p:nvPicPr>
+        <p:blipFill>
+          <a:blip r:embed="rId4">
+            <a:extLst>
+              <a:ext uri="{28A0092B-C50C-407E-A947-70E740481C1C}">
+                <a14:useLocalDpi xmlns:a14="http://schemas.microsoft.com/office/drawing/2010/main" val="0"/>
+              </a:ext>
+            </a:extLst>
+          </a:blip>
+          <a:stretch>
+            <a:fillRect/>
+          </a:stretch>
+        </p:blipFill>
+        <p:spPr>
+          <a:xfrm>
+            <a:off x="5715740" y="2815330"/>
+            <a:ext cx="1110894" cy="1110894"/>
+          </a:xfrm>
+          <a:prstGeom prst="rect">
             <a:avLst/>
           </a:prstGeom>
-          <a:ln w="9525">
-            <a:solidFill>
-              <a:srgbClr val="FF0000"/>
-            </a:solidFill>
-            <a:prstDash val="dashDot"/>
-          </a:ln>
-        </p:spPr>
-        <p:style>
-          <a:lnRef idx="1">
-            <a:schemeClr val="accent1"/>
-          </a:lnRef>
-          <a:fillRef idx="0">
-            <a:schemeClr val="accent1"/>
-          </a:fillRef>
-          <a:effectRef idx="0">
-            <a:schemeClr val="accent1"/>
-          </a:effectRef>
-          <a:fontRef idx="minor">
-            <a:schemeClr val="tx1"/>
-          </a:fontRef>
-        </p:style>
-      </p:cxnSp>
+        </p:spPr>
+      </p:pic>
+      <p:sp>
+        <p:nvSpPr>
+          <p:cNvPr id="39" name="TextBox 38">
+            <a:extLst>
+              <a:ext uri="{FF2B5EF4-FFF2-40B4-BE49-F238E27FC236}">
+                <a16:creationId xmlns:a16="http://schemas.microsoft.com/office/drawing/2014/main" id="{DDAFA515-20CF-FB49-BE91-BB6BD6646B25}"/>
+              </a:ext>
+            </a:extLst>
+          </p:cNvPr>
+          <p:cNvSpPr txBox="1"/>
+          <p:nvPr/>
+        </p:nvSpPr>
+        <p:spPr>
+          <a:xfrm>
+            <a:off x="4954155" y="2289222"/>
+            <a:ext cx="3316031" cy="584775"/>
+          </a:xfrm>
+          <a:prstGeom prst="rect">
+            <a:avLst/>
+          </a:prstGeom>
+          <a:noFill/>
+        </p:spPr>
+        <p:txBody>
+          <a:bodyPr wrap="square" rtlCol="0">
+            <a:spAutoFit/>
+          </a:bodyPr>
+          <a:lstStyle/>
+          <a:p>
+            <a:r>
+              <a:rPr lang="en-US" sz="3200" b="1" dirty="0"/>
+              <a:t>DOG CLASSIFIER</a:t>
+            </a:r>
+            <a:endParaRPr lang="en-CA" sz="3200" b="1" dirty="0"/>
+          </a:p>
+        </p:txBody>
+      </p:sp>
+      <p:pic>
+        <p:nvPicPr>
+          <p:cNvPr id="40" name="Picture 39" descr="Icon&#10;&#10;Description automatically generated">
+            <a:extLst>
+              <a:ext uri="{FF2B5EF4-FFF2-40B4-BE49-F238E27FC236}">
+                <a16:creationId xmlns:a16="http://schemas.microsoft.com/office/drawing/2014/main" id="{BDDC01F6-A400-5443-AC9B-AE7C87A6B5AF}"/>
+              </a:ext>
+            </a:extLst>
+          </p:cNvPr>
+          <p:cNvPicPr>
+            <a:picLocks noChangeAspect="1"/>
+          </p:cNvPicPr>
+          <p:nvPr/>
+        </p:nvPicPr>
+        <p:blipFill>
+          <a:blip r:embed="rId4">
+            <a:extLst>
+              <a:ext uri="{28A0092B-C50C-407E-A947-70E740481C1C}">
+                <a14:useLocalDpi xmlns:a14="http://schemas.microsoft.com/office/drawing/2010/main" val="0"/>
+              </a:ext>
+            </a:extLst>
+          </a:blip>
+          <a:stretch>
+            <a:fillRect/>
+          </a:stretch>
+        </p:blipFill>
+        <p:spPr>
+          <a:xfrm>
+            <a:off x="9583555" y="2815330"/>
+            <a:ext cx="1110894" cy="1110894"/>
+          </a:xfrm>
+          <a:prstGeom prst="rect">
+            <a:avLst/>
+          </a:prstGeom>
+        </p:spPr>
+      </p:pic>
+      <p:sp>
+        <p:nvSpPr>
+          <p:cNvPr id="41" name="TextBox 40">
+            <a:extLst>
+              <a:ext uri="{FF2B5EF4-FFF2-40B4-BE49-F238E27FC236}">
+                <a16:creationId xmlns:a16="http://schemas.microsoft.com/office/drawing/2014/main" id="{2BE5C005-6279-464A-9E64-C2D1F96A66DD}"/>
+              </a:ext>
+            </a:extLst>
+          </p:cNvPr>
+          <p:cNvSpPr txBox="1"/>
+          <p:nvPr/>
+        </p:nvSpPr>
+        <p:spPr>
+          <a:xfrm>
+            <a:off x="8284172" y="2220369"/>
+            <a:ext cx="3709661" cy="584775"/>
+          </a:xfrm>
+          <a:prstGeom prst="rect">
+            <a:avLst/>
+          </a:prstGeom>
+          <a:noFill/>
+        </p:spPr>
+        <p:txBody>
+          <a:bodyPr wrap="square" rtlCol="0">
+            <a:spAutoFit/>
+          </a:bodyPr>
+          <a:lstStyle/>
+          <a:p>
+            <a:r>
+              <a:rPr lang="en-US" sz="3200" b="1" dirty="0"/>
+              <a:t>DOG COMPARATOR</a:t>
+            </a:r>
+            <a:endParaRPr lang="en-CA" sz="3200" b="1" dirty="0"/>
+          </a:p>
+        </p:txBody>
+      </p:sp>
+      <p:sp>
+        <p:nvSpPr>
+          <p:cNvPr id="42" name="文本框 4">
+            <a:extLst>
+              <a:ext uri="{FF2B5EF4-FFF2-40B4-BE49-F238E27FC236}">
+                <a16:creationId xmlns:a16="http://schemas.microsoft.com/office/drawing/2014/main" id="{F00B3434-495A-8547-8E62-DF7ECE6D3569}"/>
+              </a:ext>
+            </a:extLst>
+          </p:cNvPr>
+          <p:cNvSpPr txBox="1"/>
+          <p:nvPr/>
+        </p:nvSpPr>
+        <p:spPr>
+          <a:xfrm>
+            <a:off x="1165593" y="4155317"/>
+            <a:ext cx="2296120" cy="1077218"/>
+          </a:xfrm>
+          <a:prstGeom prst="rect">
+            <a:avLst/>
+          </a:prstGeom>
+          <a:noFill/>
+        </p:spPr>
+        <p:txBody>
+          <a:bodyPr rot="0" spcFirstLastPara="0" vertOverflow="overflow" horzOverflow="overflow" vert="horz" wrap="square" lIns="91440" tIns="45720" rIns="91440" bIns="45720" numCol="1" spcCol="0" rtlCol="0" fromWordArt="0" anchor="t" anchorCtr="0" forceAA="0" compatLnSpc="1">
+            <a:prstTxWarp prst="textNoShape">
+              <a:avLst/>
+            </a:prstTxWarp>
+            <a:spAutoFit/>
+          </a:bodyPr>
+          <a:lstStyle/>
+          <a:p>
+            <a:pPr algn="ctr"/>
+            <a:r>
+              <a:rPr lang="en-US" altLang="zh-CN" sz="3200" b="1" dirty="0">
+                <a:ea typeface="+mn-lt"/>
+                <a:cs typeface="+mn-lt"/>
+              </a:rPr>
+              <a:t>MAP: </a:t>
+            </a:r>
+          </a:p>
+          <a:p>
+            <a:pPr algn="ctr"/>
+            <a:r>
+              <a:rPr lang="en-US" altLang="zh-CN" sz="3200" b="1" dirty="0">
+                <a:ea typeface="+mn-lt"/>
+                <a:cs typeface="+mn-lt"/>
+              </a:rPr>
+              <a:t>0.74</a:t>
+            </a:r>
+            <a:endParaRPr lang="zh-CN" sz="3200" b="1" dirty="0"/>
+          </a:p>
+        </p:txBody>
+      </p:sp>
+      <p:sp>
+        <p:nvSpPr>
+          <p:cNvPr id="43" name="文本框 4">
+            <a:extLst>
+              <a:ext uri="{FF2B5EF4-FFF2-40B4-BE49-F238E27FC236}">
+                <a16:creationId xmlns:a16="http://schemas.microsoft.com/office/drawing/2014/main" id="{80019542-B7D9-8045-86FC-B9C25312EC57}"/>
+              </a:ext>
+            </a:extLst>
+          </p:cNvPr>
+          <p:cNvSpPr txBox="1"/>
+          <p:nvPr/>
+        </p:nvSpPr>
+        <p:spPr>
+          <a:xfrm>
+            <a:off x="4901095" y="4219608"/>
+            <a:ext cx="2799531" cy="1077218"/>
+          </a:xfrm>
+          <a:prstGeom prst="rect">
+            <a:avLst/>
+          </a:prstGeom>
+          <a:noFill/>
+        </p:spPr>
+        <p:txBody>
+          <a:bodyPr rot="0" spcFirstLastPara="0" vertOverflow="overflow" horzOverflow="overflow" vert="horz" wrap="square" lIns="91440" tIns="45720" rIns="91440" bIns="45720" numCol="1" spcCol="0" rtlCol="0" fromWordArt="0" anchor="t" anchorCtr="0" forceAA="0" compatLnSpc="1">
+            <a:prstTxWarp prst="textNoShape">
+              <a:avLst/>
+            </a:prstTxWarp>
+            <a:spAutoFit/>
+          </a:bodyPr>
+          <a:lstStyle/>
+          <a:p>
+            <a:pPr algn="ctr"/>
+            <a:r>
+              <a:rPr lang="en-US" altLang="zh-CN" sz="3200" b="1" dirty="0">
+                <a:ea typeface="+mn-lt"/>
+                <a:cs typeface="+mn-lt"/>
+              </a:rPr>
+              <a:t>Top 1 Accuracy: 96%</a:t>
+            </a:r>
+            <a:endParaRPr lang="zh-CN" sz="3200" b="1" dirty="0"/>
+          </a:p>
+        </p:txBody>
+      </p:sp>
+      <p:sp>
+        <p:nvSpPr>
+          <p:cNvPr id="44" name="文本框 4">
+            <a:extLst>
+              <a:ext uri="{FF2B5EF4-FFF2-40B4-BE49-F238E27FC236}">
+                <a16:creationId xmlns:a16="http://schemas.microsoft.com/office/drawing/2014/main" id="{2EBE9C57-743A-3A49-873A-2E55C6543204}"/>
+              </a:ext>
+            </a:extLst>
+          </p:cNvPr>
+          <p:cNvSpPr txBox="1"/>
+          <p:nvPr/>
+        </p:nvSpPr>
+        <p:spPr>
+          <a:xfrm>
+            <a:off x="8468128" y="4205235"/>
+            <a:ext cx="2799531" cy="1077218"/>
+          </a:xfrm>
+          <a:prstGeom prst="rect">
+            <a:avLst/>
+          </a:prstGeom>
+          <a:noFill/>
+        </p:spPr>
+        <p:txBody>
+          <a:bodyPr rot="0" spcFirstLastPara="0" vertOverflow="overflow" horzOverflow="overflow" vert="horz" wrap="square" lIns="91440" tIns="45720" rIns="91440" bIns="45720" numCol="1" spcCol="0" rtlCol="0" fromWordArt="0" anchor="t" anchorCtr="0" forceAA="0" compatLnSpc="1">
+            <a:prstTxWarp prst="textNoShape">
+              <a:avLst/>
+            </a:prstTxWarp>
+            <a:spAutoFit/>
+          </a:bodyPr>
+          <a:lstStyle/>
+          <a:p>
+            <a:pPr algn="ctr"/>
+            <a:r>
+              <a:rPr lang="en-US" altLang="zh-CN" sz="3200" b="1" dirty="0">
+                <a:ea typeface="+mn-lt"/>
+                <a:cs typeface="+mn-lt"/>
+              </a:rPr>
+              <a:t>Top 1 Accuracy: 89%</a:t>
+            </a:r>
+            <a:endParaRPr lang="zh-CN" sz="3200" b="1" dirty="0"/>
+          </a:p>
+        </p:txBody>
+      </p:sp>
     </p:spTree>
     <p:extLst>
       <p:ext uri="{BB962C8B-B14F-4D97-AF65-F5344CB8AC3E}">
-        <p14:creationId xmlns:p14="http://schemas.microsoft.com/office/powerpoint/2010/main" val="2877303193"/>
+        <p14:creationId xmlns:p14="http://schemas.microsoft.com/office/powerpoint/2010/main" val="2548523958"/>
       </p:ext>
     </p:extLst>
   </p:cSld>
   <p:clrMapOvr>
     <a:masterClrMapping/>
   </p:clrMapOvr>
-  <mc:AlternateContent xmlns:mc="http://schemas.openxmlformats.org/markup-compatibility/2006" xmlns:p14="http://schemas.microsoft.com/office/powerpoint/2010/main">
-    <mc:Choice Requires="p14">
+  <mc:AlternateContent xmlns:mc="http://schemas.openxmlformats.org/markup-compatibility/2006">
+    <mc:Choice xmlns:p14="http://schemas.microsoft.com/office/powerpoint/2010/main" Requires="p14">
       <p:transition spd="slow" p14:dur="2000" advTm="61822"/>
     </mc:Choice>
-    <mc:Fallback xmlns="">
+    <mc:Fallback>
       <p:transition spd="slow" advTm="61822"/>
     </mc:Fallback>
   </mc:AlternateContent>
@@ -8895,7 +8882,7 @@
           <a:lstStyle/>
           <a:p>
             <a:pPr algn="ctr"/>
-            <a:endParaRPr lang="en-CA" dirty="0"/>
+            <a:endParaRPr lang="en-CA"/>
           </a:p>
         </p:txBody>
       </p:sp>
@@ -8905,269 +8892,6 @@
             <a:extLst>
               <a:ext uri="{FF2B5EF4-FFF2-40B4-BE49-F238E27FC236}">
                 <a16:creationId xmlns:a16="http://schemas.microsoft.com/office/drawing/2014/main" id="{C4748201-781A-4327-B179-0D6E205B4E49}"/>
-              </a:ext>
-            </a:extLst>
-          </p:cNvPr>
-          <p:cNvPicPr>
-            <a:picLocks noChangeAspect="1"/>
-          </p:cNvPicPr>
-          <p:nvPr/>
-        </p:nvPicPr>
-        <p:blipFill rotWithShape="1">
-          <a:blip r:embed="rId3">
-            <a:extLst>
-              <a:ext uri="{28A0092B-C50C-407E-A947-70E740481C1C}">
-                <a14:useLocalDpi xmlns:a14="http://schemas.microsoft.com/office/drawing/2010/main" val="0"/>
-              </a:ext>
-            </a:extLst>
-          </a:blip>
-          <a:srcRect r="58007" b="3574"/>
-          <a:stretch/>
-        </p:blipFill>
-        <p:spPr>
-          <a:xfrm>
-            <a:off x="1" y="-23419"/>
-            <a:ext cx="1187532" cy="632012"/>
-          </a:xfrm>
-          <a:prstGeom prst="rect">
-            <a:avLst/>
-          </a:prstGeom>
-        </p:spPr>
-      </p:pic>
-      <p:sp>
-        <p:nvSpPr>
-          <p:cNvPr id="2" name="文本框 1">
-            <a:extLst>
-              <a:ext uri="{FF2B5EF4-FFF2-40B4-BE49-F238E27FC236}">
-                <a16:creationId xmlns:a16="http://schemas.microsoft.com/office/drawing/2014/main" id="{F3344798-B676-4FE0-8E17-1763BD368CCF}"/>
-              </a:ext>
-            </a:extLst>
-          </p:cNvPr>
-          <p:cNvSpPr txBox="1"/>
-          <p:nvPr/>
-        </p:nvSpPr>
-        <p:spPr>
-          <a:xfrm>
-            <a:off x="58325" y="669807"/>
-            <a:ext cx="4652902" cy="830997"/>
-          </a:xfrm>
-          <a:prstGeom prst="rect">
-            <a:avLst/>
-          </a:prstGeom>
-          <a:noFill/>
-        </p:spPr>
-        <p:txBody>
-          <a:bodyPr rot="0" spcFirstLastPara="0" vertOverflow="overflow" horzOverflow="overflow" vert="horz" wrap="square" lIns="91440" tIns="45720" rIns="91440" bIns="45720" numCol="1" spcCol="0" rtlCol="0" fromWordArt="0" anchor="t" anchorCtr="0" forceAA="0" compatLnSpc="1">
-            <a:prstTxWarp prst="textNoShape">
-              <a:avLst/>
-            </a:prstTxWarp>
-            <a:spAutoFit/>
-          </a:bodyPr>
-          <a:lstStyle/>
-          <a:p>
-            <a:r>
-              <a:rPr lang="en-US" altLang="zh-CN" sz="4800" b="1" dirty="0">
-                <a:solidFill>
-                  <a:schemeClr val="bg1"/>
-                </a:solidFill>
-                <a:ea typeface="+mn-lt"/>
-                <a:cs typeface="+mn-lt"/>
-              </a:rPr>
-              <a:t>Results</a:t>
-            </a:r>
-            <a:endParaRPr lang="zh-CN" sz="4800" b="1" dirty="0">
-              <a:solidFill>
-                <a:schemeClr val="bg1"/>
-              </a:solidFill>
-              <a:ea typeface="+mn-lt"/>
-              <a:cs typeface="+mn-lt"/>
-            </a:endParaRPr>
-          </a:p>
-        </p:txBody>
-      </p:sp>
-      <p:sp>
-        <p:nvSpPr>
-          <p:cNvPr id="5" name="文本框 4">
-            <a:extLst>
-              <a:ext uri="{FF2B5EF4-FFF2-40B4-BE49-F238E27FC236}">
-                <a16:creationId xmlns:a16="http://schemas.microsoft.com/office/drawing/2014/main" id="{68B1BA4B-3F2D-413D-B877-61D78EEBE4EB}"/>
-              </a:ext>
-            </a:extLst>
-          </p:cNvPr>
-          <p:cNvSpPr txBox="1"/>
-          <p:nvPr/>
-        </p:nvSpPr>
-        <p:spPr>
-          <a:xfrm>
-            <a:off x="1955" y="1510594"/>
-            <a:ext cx="9807063" cy="584775"/>
-          </a:xfrm>
-          <a:prstGeom prst="rect">
-            <a:avLst/>
-          </a:prstGeom>
-          <a:noFill/>
-        </p:spPr>
-        <p:txBody>
-          <a:bodyPr rot="0" spcFirstLastPara="0" vertOverflow="overflow" horzOverflow="overflow" vert="horz" wrap="square" lIns="91440" tIns="45720" rIns="91440" bIns="45720" numCol="1" spcCol="0" rtlCol="0" fromWordArt="0" anchor="t" anchorCtr="0" forceAA="0" compatLnSpc="1">
-            <a:prstTxWarp prst="textNoShape">
-              <a:avLst/>
-            </a:prstTxWarp>
-            <a:spAutoFit/>
-          </a:bodyPr>
-          <a:lstStyle/>
-          <a:p>
-            <a:r>
-              <a:rPr lang="en-US" altLang="zh-CN" sz="3200" dirty="0">
-                <a:ea typeface="+mn-lt"/>
-                <a:cs typeface="+mn-lt"/>
-              </a:rPr>
-              <a:t>Dog Classifier Model:</a:t>
-            </a:r>
-            <a:endParaRPr lang="zh-CN" sz="3200" dirty="0"/>
-          </a:p>
-        </p:txBody>
-      </p:sp>
-      <p:sp>
-        <p:nvSpPr>
-          <p:cNvPr id="7" name="文本框 4">
-            <a:extLst>
-              <a:ext uri="{FF2B5EF4-FFF2-40B4-BE49-F238E27FC236}">
-                <a16:creationId xmlns:a16="http://schemas.microsoft.com/office/drawing/2014/main" id="{4FA5D0E2-4A21-4360-9463-BD4C322FB450}"/>
-              </a:ext>
-            </a:extLst>
-          </p:cNvPr>
-          <p:cNvSpPr txBox="1"/>
-          <p:nvPr/>
-        </p:nvSpPr>
-        <p:spPr>
-          <a:xfrm>
-            <a:off x="182063" y="2124629"/>
-            <a:ext cx="9807063" cy="430887"/>
-          </a:xfrm>
-          <a:prstGeom prst="rect">
-            <a:avLst/>
-          </a:prstGeom>
-          <a:noFill/>
-        </p:spPr>
-        <p:txBody>
-          <a:bodyPr rot="0" spcFirstLastPara="0" vertOverflow="overflow" horzOverflow="overflow" vert="horz" wrap="square" lIns="91440" tIns="45720" rIns="91440" bIns="45720" numCol="1" spcCol="0" rtlCol="0" fromWordArt="0" anchor="t" anchorCtr="0" forceAA="0" compatLnSpc="1">
-            <a:prstTxWarp prst="textNoShape">
-              <a:avLst/>
-            </a:prstTxWarp>
-            <a:spAutoFit/>
-          </a:bodyPr>
-          <a:lstStyle/>
-          <a:p>
-            <a:pPr marL="457200" indent="-457200">
-              <a:buFont typeface="Arial" panose="020B0604020202020204" pitchFamily="34" charset="0"/>
-              <a:buChar char="•"/>
-            </a:pPr>
-            <a:r>
-              <a:rPr lang="en-US" altLang="zh-CN" sz="2200" dirty="0">
-                <a:ea typeface="+mn-lt"/>
-                <a:cs typeface="+mn-lt"/>
-              </a:rPr>
-              <a:t>Achieved top one accuracy of 97% and 96% on the validation and test data sets. </a:t>
-            </a:r>
-          </a:p>
-        </p:txBody>
-      </p:sp>
-      <p:sp>
-        <p:nvSpPr>
-          <p:cNvPr id="9" name="Equals 8">
-            <a:extLst>
-              <a:ext uri="{FF2B5EF4-FFF2-40B4-BE49-F238E27FC236}">
-                <a16:creationId xmlns:a16="http://schemas.microsoft.com/office/drawing/2014/main" id="{5DF8F42C-F1D8-44B6-B88F-C7F0BD832C65}"/>
-              </a:ext>
-            </a:extLst>
-          </p:cNvPr>
-          <p:cNvSpPr/>
-          <p:nvPr/>
-        </p:nvSpPr>
-        <p:spPr>
-          <a:xfrm>
-            <a:off x="5867874" y="4152296"/>
-            <a:ext cx="409575" cy="300379"/>
-          </a:xfrm>
-          <a:prstGeom prst="mathEqual">
-            <a:avLst/>
-          </a:prstGeom>
-          <a:solidFill>
-            <a:schemeClr val="tx1"/>
-          </a:solidFill>
-          <a:ln w="6350"/>
-        </p:spPr>
-        <p:style>
-          <a:lnRef idx="2">
-            <a:schemeClr val="accent1">
-              <a:shade val="50000"/>
-            </a:schemeClr>
-          </a:lnRef>
-          <a:fillRef idx="1">
-            <a:schemeClr val="accent1"/>
-          </a:fillRef>
-          <a:effectRef idx="0">
-            <a:schemeClr val="accent1"/>
-          </a:effectRef>
-          <a:fontRef idx="minor">
-            <a:schemeClr val="lt1"/>
-          </a:fontRef>
-        </p:style>
-        <p:txBody>
-          <a:bodyPr rtlCol="0" anchor="ctr"/>
-          <a:lstStyle/>
-          <a:p>
-            <a:pPr algn="ctr"/>
-            <a:endParaRPr lang="en-CA">
-              <a:solidFill>
-                <a:schemeClr val="tx1"/>
-              </a:solidFill>
-            </a:endParaRPr>
-          </a:p>
-        </p:txBody>
-      </p:sp>
-      <p:sp>
-        <p:nvSpPr>
-          <p:cNvPr id="10" name="TextBox 9">
-            <a:extLst>
-              <a:ext uri="{FF2B5EF4-FFF2-40B4-BE49-F238E27FC236}">
-                <a16:creationId xmlns:a16="http://schemas.microsoft.com/office/drawing/2014/main" id="{7E46A69B-BC5B-47D0-A9AD-026994A4E8E0}"/>
-              </a:ext>
-            </a:extLst>
-          </p:cNvPr>
-          <p:cNvSpPr txBox="1"/>
-          <p:nvPr/>
-        </p:nvSpPr>
-        <p:spPr>
-          <a:xfrm>
-            <a:off x="5819043" y="3709004"/>
-            <a:ext cx="465009" cy="553998"/>
-          </a:xfrm>
-          <a:prstGeom prst="rect">
-            <a:avLst/>
-          </a:prstGeom>
-          <a:noFill/>
-        </p:spPr>
-        <p:txBody>
-          <a:bodyPr wrap="square" rtlCol="0">
-            <a:spAutoFit/>
-          </a:bodyPr>
-          <a:lstStyle/>
-          <a:p>
-            <a:pPr algn="ctr"/>
-            <a:r>
-              <a:rPr lang="en-CA" sz="3000" b="1" dirty="0"/>
-              <a:t>?</a:t>
-            </a:r>
-          </a:p>
-        </p:txBody>
-      </p:sp>
-      <p:pic>
-        <p:nvPicPr>
-          <p:cNvPr id="11" name="Picture 10" descr="A dog lying in the grass&#10;&#10;Description automatically generated with medium confidence">
-            <a:extLst>
-              <a:ext uri="{FF2B5EF4-FFF2-40B4-BE49-F238E27FC236}">
-                <a16:creationId xmlns:a16="http://schemas.microsoft.com/office/drawing/2014/main" id="{1526AF7D-F2F8-430D-9940-9697E04EE395}"/>
               </a:ext>
             </a:extLst>
           </p:cNvPr>
@@ -9184,13 +8908,13 @@
               </a:ext>
             </a:extLst>
           </a:blip>
-          <a:srcRect l="9315" t="7696" r="22709" b="6483"/>
+          <a:srcRect r="58007" b="3574"/>
           <a:stretch/>
         </p:blipFill>
         <p:spPr>
           <a:xfrm>
-            <a:off x="4276570" y="3503164"/>
-            <a:ext cx="1542473" cy="1298263"/>
+            <a:off x="1" y="-23419"/>
+            <a:ext cx="1187532" cy="632012"/>
           </a:xfrm>
           <a:prstGeom prst="rect">
             <a:avLst/>
@@ -9199,10 +8923,10 @@
       </p:pic>
       <p:sp>
         <p:nvSpPr>
-          <p:cNvPr id="3" name="TextBox 2">
+          <p:cNvPr id="2" name="文本框 1">
             <a:extLst>
               <a:ext uri="{FF2B5EF4-FFF2-40B4-BE49-F238E27FC236}">
-                <a16:creationId xmlns:a16="http://schemas.microsoft.com/office/drawing/2014/main" id="{52CC0D31-89E0-4287-858F-6A683473F4C7}"/>
+                <a16:creationId xmlns:a16="http://schemas.microsoft.com/office/drawing/2014/main" id="{F3344798-B676-4FE0-8E17-1763BD368CCF}"/>
               </a:ext>
             </a:extLst>
           </p:cNvPr>
@@ -9211,8 +8935,8 @@
         </p:nvSpPr>
         <p:spPr>
           <a:xfrm>
-            <a:off x="6277449" y="4063958"/>
-            <a:ext cx="2789695" cy="477054"/>
+            <a:off x="58325" y="669807"/>
+            <a:ext cx="4652902" cy="830997"/>
           </a:xfrm>
           <a:prstGeom prst="rect">
             <a:avLst/>
@@ -9220,22 +8944,41 @@
           <a:noFill/>
         </p:spPr>
         <p:txBody>
-          <a:bodyPr wrap="square" rtlCol="0">
+          <a:bodyPr rot="0" spcFirstLastPara="0" vertOverflow="overflow" horzOverflow="overflow" vert="horz" wrap="square" lIns="91440" tIns="45720" rIns="91440" bIns="45720" numCol="1" spcCol="0" rtlCol="0" fromWordArt="0" anchor="t" anchorCtr="0" forceAA="0" compatLnSpc="1">
+            <a:prstTxWarp prst="textNoShape">
+              <a:avLst/>
+            </a:prstTxWarp>
             <a:spAutoFit/>
           </a:bodyPr>
           <a:lstStyle/>
           <a:p>
             <a:r>
-              <a:rPr lang="en-CA" sz="2500" b="1" dirty="0"/>
-              <a:t>Golden Retriever</a:t>
-            </a:r>
+              <a:rPr lang="en-US" altLang="zh-CN" sz="4800" b="1" dirty="0">
+                <a:solidFill>
+                  <a:schemeClr val="bg1"/>
+                </a:solidFill>
+                <a:ea typeface="+mn-lt"/>
+                <a:cs typeface="+mn-lt"/>
+              </a:rPr>
+              <a:t>Demo</a:t>
+            </a:r>
+            <a:endParaRPr lang="zh-CN" sz="4800" b="1" dirty="0">
+              <a:solidFill>
+                <a:schemeClr val="bg1"/>
+              </a:solidFill>
+              <a:ea typeface="+mn-lt"/>
+              <a:cs typeface="+mn-lt"/>
+            </a:endParaRPr>
           </a:p>
         </p:txBody>
       </p:sp>
     </p:spTree>
+    <p:custDataLst>
+      <p:tags r:id="rId1"/>
+    </p:custDataLst>
     <p:extLst>
       <p:ext uri="{BB962C8B-B14F-4D97-AF65-F5344CB8AC3E}">
-        <p14:creationId xmlns:p14="http://schemas.microsoft.com/office/powerpoint/2010/main" val="2950725308"/>
+        <p14:creationId xmlns:p14="http://schemas.microsoft.com/office/powerpoint/2010/main" val="1451829119"/>
       </p:ext>
     </p:extLst>
   </p:cSld>
@@ -9244,12 +8987,25 @@
   </p:clrMapOvr>
   <mc:AlternateContent xmlns:mc="http://schemas.openxmlformats.org/markup-compatibility/2006" xmlns:p14="http://schemas.microsoft.com/office/powerpoint/2010/main">
     <mc:Choice Requires="p14">
-      <p:transition spd="slow" p14:dur="2000" advTm="61822"/>
+      <p:transition spd="slow" p14:dur="2000" advTm="64283"/>
     </mc:Choice>
     <mc:Fallback xmlns="">
-      <p:transition spd="slow" advTm="61822"/>
+      <p:transition spd="slow" advTm="64283"/>
     </mc:Fallback>
   </mc:AlternateContent>
+  <p:extLst>
+    <p:ext uri="{E180D4A7-C9FB-4DFB-919C-405C955672EB}">
+      <p14:showEvtLst xmlns:p14="http://schemas.microsoft.com/office/powerpoint/2010/main">
+        <p14:playEvt time="2202" objId="3"/>
+        <p14:triggerEvt type="onClick" time="2202" objId="3"/>
+        <p14:triggerEvt type="onClick" time="28512" objId="3"/>
+        <p14:triggerEvt type="onClick" time="36423" objId="3"/>
+        <p14:stopEvt time="63194" objId="3"/>
+        <p14:playEvt time="63229" objId="3"/>
+        <p14:pauseEvt time="64246" objId="3"/>
+      </p14:showEvtLst>
+    </p:ext>
+  </p:extLst>
 </p:sld>
 </file>
 
@@ -9446,656 +9202,6 @@
                 <a:ea typeface="+mn-lt"/>
                 <a:cs typeface="+mn-lt"/>
               </a:rPr>
-              <a:t>Dog Comparator Model:</a:t>
-            </a:r>
-            <a:endParaRPr lang="zh-CN" sz="3200" dirty="0"/>
-          </a:p>
-        </p:txBody>
-      </p:sp>
-      <p:sp>
-        <p:nvSpPr>
-          <p:cNvPr id="12" name="文本框 4">
-            <a:extLst>
-              <a:ext uri="{FF2B5EF4-FFF2-40B4-BE49-F238E27FC236}">
-                <a16:creationId xmlns:a16="http://schemas.microsoft.com/office/drawing/2014/main" id="{DC558B22-061B-4C8F-9EA5-EB48CBE416E9}"/>
-              </a:ext>
-            </a:extLst>
-          </p:cNvPr>
-          <p:cNvSpPr txBox="1"/>
-          <p:nvPr/>
-        </p:nvSpPr>
-        <p:spPr>
-          <a:xfrm>
-            <a:off x="366791" y="2082633"/>
-            <a:ext cx="9807063" cy="769441"/>
-          </a:xfrm>
-          <a:prstGeom prst="rect">
-            <a:avLst/>
-          </a:prstGeom>
-          <a:noFill/>
-        </p:spPr>
-        <p:txBody>
-          <a:bodyPr rot="0" spcFirstLastPara="0" vertOverflow="overflow" horzOverflow="overflow" vert="horz" wrap="square" lIns="91440" tIns="45720" rIns="91440" bIns="45720" numCol="1" spcCol="0" rtlCol="0" fromWordArt="0" anchor="t" anchorCtr="0" forceAA="0" compatLnSpc="1">
-            <a:prstTxWarp prst="textNoShape">
-              <a:avLst/>
-            </a:prstTxWarp>
-            <a:spAutoFit/>
-          </a:bodyPr>
-          <a:lstStyle/>
-          <a:p>
-            <a:pPr marL="457200" indent="-457200">
-              <a:buFont typeface="Arial" panose="020B0604020202020204" pitchFamily="34" charset="0"/>
-              <a:buChar char="•"/>
-            </a:pPr>
-            <a:r>
-              <a:rPr lang="en-US" altLang="zh-CN" sz="2200" dirty="0">
-                <a:ea typeface="+mn-lt"/>
-                <a:cs typeface="+mn-lt"/>
-              </a:rPr>
-              <a:t>Achieved Classification Accuracy of 89% over randomly selected images of either the same or different dogs</a:t>
-            </a:r>
-          </a:p>
-        </p:txBody>
-      </p:sp>
-      <p:sp>
-        <p:nvSpPr>
-          <p:cNvPr id="13" name="文本框 4">
-            <a:extLst>
-              <a:ext uri="{FF2B5EF4-FFF2-40B4-BE49-F238E27FC236}">
-                <a16:creationId xmlns:a16="http://schemas.microsoft.com/office/drawing/2014/main" id="{D90BA285-4B37-4ABC-B812-568FB4742A6E}"/>
-              </a:ext>
-            </a:extLst>
-          </p:cNvPr>
-          <p:cNvSpPr txBox="1"/>
-          <p:nvPr/>
-        </p:nvSpPr>
-        <p:spPr>
-          <a:xfrm>
-            <a:off x="366790" y="4292490"/>
-            <a:ext cx="9807063" cy="769441"/>
-          </a:xfrm>
-          <a:prstGeom prst="rect">
-            <a:avLst/>
-          </a:prstGeom>
-          <a:noFill/>
-        </p:spPr>
-        <p:txBody>
-          <a:bodyPr rot="0" spcFirstLastPara="0" vertOverflow="overflow" horzOverflow="overflow" vert="horz" wrap="square" lIns="91440" tIns="45720" rIns="91440" bIns="45720" numCol="1" spcCol="0" rtlCol="0" fromWordArt="0" anchor="t" anchorCtr="0" forceAA="0" compatLnSpc="1">
-            <a:prstTxWarp prst="textNoShape">
-              <a:avLst/>
-            </a:prstTxWarp>
-            <a:spAutoFit/>
-          </a:bodyPr>
-          <a:lstStyle/>
-          <a:p>
-            <a:pPr marL="457200" indent="-457200">
-              <a:buFont typeface="Arial" panose="020B0604020202020204" pitchFamily="34" charset="0"/>
-              <a:buChar char="•"/>
-            </a:pPr>
-            <a:r>
-              <a:rPr lang="en-US" altLang="zh-CN" sz="2200" dirty="0">
-                <a:ea typeface="+mn-lt"/>
-                <a:cs typeface="+mn-lt"/>
-              </a:rPr>
-              <a:t>Achieved Classification Accuracy of 79% over randomly selected images of the same or different dogs (from the same breed)</a:t>
-            </a:r>
-          </a:p>
-        </p:txBody>
-      </p:sp>
-      <p:pic>
-        <p:nvPicPr>
-          <p:cNvPr id="1026" name="Picture 2" descr="How to Groom a German Shepherd Dog – American Kennel Club">
-            <a:extLst>
-              <a:ext uri="{FF2B5EF4-FFF2-40B4-BE49-F238E27FC236}">
-                <a16:creationId xmlns:a16="http://schemas.microsoft.com/office/drawing/2014/main" id="{30465E23-4D5E-4B48-AE0D-C2300BC7CD72}"/>
-              </a:ext>
-            </a:extLst>
-          </p:cNvPr>
-          <p:cNvPicPr>
-            <a:picLocks noChangeAspect="1" noChangeArrowheads="1"/>
-          </p:cNvPicPr>
-          <p:nvPr/>
-        </p:nvPicPr>
-        <p:blipFill rotWithShape="1">
-          <a:blip r:embed="rId4">
-            <a:extLst>
-              <a:ext uri="{28A0092B-C50C-407E-A947-70E740481C1C}">
-                <a14:useLocalDpi xmlns:a14="http://schemas.microsoft.com/office/drawing/2010/main" val="0"/>
-              </a:ext>
-            </a:extLst>
-          </a:blip>
-          <a:srcRect l="5272" t="13696" r="22805" b="10646"/>
-          <a:stretch/>
-        </p:blipFill>
-        <p:spPr bwMode="auto">
-          <a:xfrm>
-            <a:off x="3187311" y="5134916"/>
-            <a:ext cx="1856510" cy="1311563"/>
-          </a:xfrm>
-          <a:prstGeom prst="rect">
-            <a:avLst/>
-          </a:prstGeom>
-          <a:noFill/>
-          <a:extLst>
-            <a:ext uri="{909E8E84-426E-40DD-AFC4-6F175D3DCCD1}">
-              <a14:hiddenFill xmlns:a14="http://schemas.microsoft.com/office/drawing/2010/main">
-                <a:solidFill>
-                  <a:srgbClr val="FFFFFF"/>
-                </a:solidFill>
-              </a14:hiddenFill>
-            </a:ext>
-          </a:extLst>
-        </p:spPr>
-      </p:pic>
-      <p:sp>
-        <p:nvSpPr>
-          <p:cNvPr id="14" name="Equals 13">
-            <a:extLst>
-              <a:ext uri="{FF2B5EF4-FFF2-40B4-BE49-F238E27FC236}">
-                <a16:creationId xmlns:a16="http://schemas.microsoft.com/office/drawing/2014/main" id="{45341C4B-766F-4386-85F3-2EF945FADA3D}"/>
-              </a:ext>
-            </a:extLst>
-          </p:cNvPr>
-          <p:cNvSpPr/>
-          <p:nvPr/>
-        </p:nvSpPr>
-        <p:spPr>
-          <a:xfrm>
-            <a:off x="5177054" y="5790698"/>
-            <a:ext cx="409575" cy="300379"/>
-          </a:xfrm>
-          <a:prstGeom prst="mathEqual">
-            <a:avLst/>
-          </a:prstGeom>
-          <a:solidFill>
-            <a:schemeClr val="tx1"/>
-          </a:solidFill>
-          <a:ln w="6350"/>
-        </p:spPr>
-        <p:style>
-          <a:lnRef idx="2">
-            <a:schemeClr val="accent1">
-              <a:shade val="50000"/>
-            </a:schemeClr>
-          </a:lnRef>
-          <a:fillRef idx="1">
-            <a:schemeClr val="accent1"/>
-          </a:fillRef>
-          <a:effectRef idx="0">
-            <a:schemeClr val="accent1"/>
-          </a:effectRef>
-          <a:fontRef idx="minor">
-            <a:schemeClr val="lt1"/>
-          </a:fontRef>
-        </p:style>
-        <p:txBody>
-          <a:bodyPr rtlCol="0" anchor="ctr"/>
-          <a:lstStyle/>
-          <a:p>
-            <a:pPr algn="ctr"/>
-            <a:endParaRPr lang="en-CA">
-              <a:solidFill>
-                <a:schemeClr val="tx1"/>
-              </a:solidFill>
-            </a:endParaRPr>
-          </a:p>
-        </p:txBody>
-      </p:sp>
-      <p:sp>
-        <p:nvSpPr>
-          <p:cNvPr id="15" name="TextBox 14">
-            <a:extLst>
-              <a:ext uri="{FF2B5EF4-FFF2-40B4-BE49-F238E27FC236}">
-                <a16:creationId xmlns:a16="http://schemas.microsoft.com/office/drawing/2014/main" id="{7ACD424F-AE23-4CEE-9CFC-171A1C09A741}"/>
-              </a:ext>
-            </a:extLst>
-          </p:cNvPr>
-          <p:cNvSpPr txBox="1"/>
-          <p:nvPr/>
-        </p:nvSpPr>
-        <p:spPr>
-          <a:xfrm>
-            <a:off x="5128223" y="5347406"/>
-            <a:ext cx="465009" cy="553998"/>
-          </a:xfrm>
-          <a:prstGeom prst="rect">
-            <a:avLst/>
-          </a:prstGeom>
-          <a:noFill/>
-        </p:spPr>
-        <p:txBody>
-          <a:bodyPr wrap="square" rtlCol="0">
-            <a:spAutoFit/>
-          </a:bodyPr>
-          <a:lstStyle/>
-          <a:p>
-            <a:pPr algn="ctr"/>
-            <a:r>
-              <a:rPr lang="en-CA" sz="3000" b="1" dirty="0"/>
-              <a:t>?</a:t>
-            </a:r>
-          </a:p>
-        </p:txBody>
-      </p:sp>
-      <p:pic>
-        <p:nvPicPr>
-          <p:cNvPr id="9" name="Picture 8" descr="A dog sitting in the grass&#10;&#10;Description automatically generated with medium confidence">
-            <a:extLst>
-              <a:ext uri="{FF2B5EF4-FFF2-40B4-BE49-F238E27FC236}">
-                <a16:creationId xmlns:a16="http://schemas.microsoft.com/office/drawing/2014/main" id="{1D1B5008-33A6-4917-80B4-7F5DF4025ACD}"/>
-              </a:ext>
-            </a:extLst>
-          </p:cNvPr>
-          <p:cNvPicPr>
-            <a:picLocks noChangeAspect="1"/>
-          </p:cNvPicPr>
-          <p:nvPr/>
-        </p:nvPicPr>
-        <p:blipFill rotWithShape="1">
-          <a:blip r:embed="rId5">
-            <a:extLst>
-              <a:ext uri="{28A0092B-C50C-407E-A947-70E740481C1C}">
-                <a14:useLocalDpi xmlns:a14="http://schemas.microsoft.com/office/drawing/2010/main" val="0"/>
-              </a:ext>
-            </a:extLst>
-          </a:blip>
-          <a:srcRect l="15452" r="10097" b="3266"/>
-          <a:stretch/>
-        </p:blipFill>
-        <p:spPr>
-          <a:xfrm>
-            <a:off x="5755433" y="5140608"/>
-            <a:ext cx="849940" cy="1311563"/>
-          </a:xfrm>
-          <a:prstGeom prst="rect">
-            <a:avLst/>
-          </a:prstGeom>
-        </p:spPr>
-      </p:pic>
-      <p:pic>
-        <p:nvPicPr>
-          <p:cNvPr id="17" name="Picture 2" descr="How to Groom a German Shepherd Dog – American Kennel Club">
-            <a:extLst>
-              <a:ext uri="{FF2B5EF4-FFF2-40B4-BE49-F238E27FC236}">
-                <a16:creationId xmlns:a16="http://schemas.microsoft.com/office/drawing/2014/main" id="{6444C42F-7949-4965-895C-D8865CFDE4ED}"/>
-              </a:ext>
-            </a:extLst>
-          </p:cNvPr>
-          <p:cNvPicPr>
-            <a:picLocks noChangeAspect="1" noChangeArrowheads="1"/>
-          </p:cNvPicPr>
-          <p:nvPr/>
-        </p:nvPicPr>
-        <p:blipFill rotWithShape="1">
-          <a:blip r:embed="rId4">
-            <a:extLst>
-              <a:ext uri="{28A0092B-C50C-407E-A947-70E740481C1C}">
-                <a14:useLocalDpi xmlns:a14="http://schemas.microsoft.com/office/drawing/2010/main" val="0"/>
-              </a:ext>
-            </a:extLst>
-          </a:blip>
-          <a:srcRect l="5272" t="13696" r="22805" b="10646"/>
-          <a:stretch/>
-        </p:blipFill>
-        <p:spPr bwMode="auto">
-          <a:xfrm>
-            <a:off x="3180708" y="2915800"/>
-            <a:ext cx="1856510" cy="1311563"/>
-          </a:xfrm>
-          <a:prstGeom prst="rect">
-            <a:avLst/>
-          </a:prstGeom>
-          <a:noFill/>
-          <a:extLst>
-            <a:ext uri="{909E8E84-426E-40DD-AFC4-6F175D3DCCD1}">
-              <a14:hiddenFill xmlns:a14="http://schemas.microsoft.com/office/drawing/2010/main">
-                <a:solidFill>
-                  <a:srgbClr val="FFFFFF"/>
-                </a:solidFill>
-              </a14:hiddenFill>
-            </a:ext>
-          </a:extLst>
-        </p:spPr>
-      </p:pic>
-      <p:sp>
-        <p:nvSpPr>
-          <p:cNvPr id="18" name="Equals 17">
-            <a:extLst>
-              <a:ext uri="{FF2B5EF4-FFF2-40B4-BE49-F238E27FC236}">
-                <a16:creationId xmlns:a16="http://schemas.microsoft.com/office/drawing/2014/main" id="{161A0229-85C5-4DA2-BDD6-F6F2AA7C2A16}"/>
-              </a:ext>
-            </a:extLst>
-          </p:cNvPr>
-          <p:cNvSpPr/>
-          <p:nvPr/>
-        </p:nvSpPr>
-        <p:spPr>
-          <a:xfrm>
-            <a:off x="5170451" y="3571582"/>
-            <a:ext cx="409575" cy="300379"/>
-          </a:xfrm>
-          <a:prstGeom prst="mathEqual">
-            <a:avLst/>
-          </a:prstGeom>
-          <a:solidFill>
-            <a:schemeClr val="tx1"/>
-          </a:solidFill>
-          <a:ln w="6350"/>
-        </p:spPr>
-        <p:style>
-          <a:lnRef idx="2">
-            <a:schemeClr val="accent1">
-              <a:shade val="50000"/>
-            </a:schemeClr>
-          </a:lnRef>
-          <a:fillRef idx="1">
-            <a:schemeClr val="accent1"/>
-          </a:fillRef>
-          <a:effectRef idx="0">
-            <a:schemeClr val="accent1"/>
-          </a:effectRef>
-          <a:fontRef idx="minor">
-            <a:schemeClr val="lt1"/>
-          </a:fontRef>
-        </p:style>
-        <p:txBody>
-          <a:bodyPr rtlCol="0" anchor="ctr"/>
-          <a:lstStyle/>
-          <a:p>
-            <a:pPr algn="ctr"/>
-            <a:endParaRPr lang="en-CA">
-              <a:solidFill>
-                <a:schemeClr val="tx1"/>
-              </a:solidFill>
-            </a:endParaRPr>
-          </a:p>
-        </p:txBody>
-      </p:sp>
-      <p:sp>
-        <p:nvSpPr>
-          <p:cNvPr id="19" name="TextBox 18">
-            <a:extLst>
-              <a:ext uri="{FF2B5EF4-FFF2-40B4-BE49-F238E27FC236}">
-                <a16:creationId xmlns:a16="http://schemas.microsoft.com/office/drawing/2014/main" id="{5304658A-A2C6-4F7E-85C8-264A8134D871}"/>
-              </a:ext>
-            </a:extLst>
-          </p:cNvPr>
-          <p:cNvSpPr txBox="1"/>
-          <p:nvPr/>
-        </p:nvSpPr>
-        <p:spPr>
-          <a:xfrm>
-            <a:off x="5121620" y="3128290"/>
-            <a:ext cx="465009" cy="553998"/>
-          </a:xfrm>
-          <a:prstGeom prst="rect">
-            <a:avLst/>
-          </a:prstGeom>
-          <a:noFill/>
-        </p:spPr>
-        <p:txBody>
-          <a:bodyPr wrap="square" rtlCol="0">
-            <a:spAutoFit/>
-          </a:bodyPr>
-          <a:lstStyle/>
-          <a:p>
-            <a:pPr algn="ctr"/>
-            <a:r>
-              <a:rPr lang="en-CA" sz="3000" b="1" dirty="0"/>
-              <a:t>?</a:t>
-            </a:r>
-          </a:p>
-        </p:txBody>
-      </p:sp>
-      <p:pic>
-        <p:nvPicPr>
-          <p:cNvPr id="20" name="Picture 19" descr="A dog lying in the grass&#10;&#10;Description automatically generated with medium confidence">
-            <a:extLst>
-              <a:ext uri="{FF2B5EF4-FFF2-40B4-BE49-F238E27FC236}">
-                <a16:creationId xmlns:a16="http://schemas.microsoft.com/office/drawing/2014/main" id="{67AE0F46-4499-4362-8C22-7409860A75D1}"/>
-              </a:ext>
-            </a:extLst>
-          </p:cNvPr>
-          <p:cNvPicPr>
-            <a:picLocks noChangeAspect="1"/>
-          </p:cNvPicPr>
-          <p:nvPr/>
-        </p:nvPicPr>
-        <p:blipFill rotWithShape="1">
-          <a:blip r:embed="rId6">
-            <a:extLst>
-              <a:ext uri="{28A0092B-C50C-407E-A947-70E740481C1C}">
-                <a14:useLocalDpi xmlns:a14="http://schemas.microsoft.com/office/drawing/2010/main" val="0"/>
-              </a:ext>
-            </a:extLst>
-          </a:blip>
-          <a:srcRect l="9315" t="7696" r="22709" b="6483"/>
-          <a:stretch/>
-        </p:blipFill>
-        <p:spPr>
-          <a:xfrm>
-            <a:off x="5719862" y="2929100"/>
-            <a:ext cx="1542473" cy="1298263"/>
-          </a:xfrm>
-          <a:prstGeom prst="rect">
-            <a:avLst/>
-          </a:prstGeom>
-        </p:spPr>
-      </p:pic>
-    </p:spTree>
-    <p:extLst>
-      <p:ext uri="{BB962C8B-B14F-4D97-AF65-F5344CB8AC3E}">
-        <p14:creationId xmlns:p14="http://schemas.microsoft.com/office/powerpoint/2010/main" val="2022231309"/>
-      </p:ext>
-    </p:extLst>
-  </p:cSld>
-  <p:clrMapOvr>
-    <a:masterClrMapping/>
-  </p:clrMapOvr>
-  <mc:AlternateContent xmlns:mc="http://schemas.openxmlformats.org/markup-compatibility/2006" xmlns:p14="http://schemas.microsoft.com/office/powerpoint/2010/main">
-    <mc:Choice Requires="p14">
-      <p:transition spd="slow" p14:dur="2000" advTm="61822"/>
-    </mc:Choice>
-    <mc:Fallback xmlns="">
-      <p:transition spd="slow" advTm="61822"/>
-    </mc:Fallback>
-  </mc:AlternateContent>
-</p:sld>
-</file>
-
-<file path=ppt/slides/slide8.xml><?xml version="1.0" encoding="utf-8"?>
-<p:sld xmlns:a="http://schemas.openxmlformats.org/drawingml/2006/main" xmlns:r="http://schemas.openxmlformats.org/officeDocument/2006/relationships" xmlns:p="http://schemas.openxmlformats.org/presentationml/2006/main">
-  <p:cSld>
-    <p:spTree>
-      <p:nvGrpSpPr>
-        <p:cNvPr id="1" name=""/>
-        <p:cNvGrpSpPr/>
-        <p:nvPr/>
-      </p:nvGrpSpPr>
-      <p:grpSpPr>
-        <a:xfrm>
-          <a:off x="0" y="0"/>
-          <a:ext cx="0" cy="0"/>
-          <a:chOff x="0" y="0"/>
-          <a:chExt cx="0" cy="0"/>
-        </a:xfrm>
-      </p:grpSpPr>
-      <p:sp>
-        <p:nvSpPr>
-          <p:cNvPr id="4" name="Rectangle 3">
-            <a:extLst>
-              <a:ext uri="{FF2B5EF4-FFF2-40B4-BE49-F238E27FC236}">
-                <a16:creationId xmlns:a16="http://schemas.microsoft.com/office/drawing/2014/main" id="{9763CB71-770E-4583-9A6B-BFD2CD649B27}"/>
-              </a:ext>
-            </a:extLst>
-          </p:cNvPr>
-          <p:cNvSpPr/>
-          <p:nvPr/>
-        </p:nvSpPr>
-        <p:spPr>
-          <a:xfrm>
-            <a:off x="0" y="-18814"/>
-            <a:ext cx="12192000" cy="1412826"/>
-          </a:xfrm>
-          <a:prstGeom prst="rect">
-            <a:avLst/>
-          </a:prstGeom>
-          <a:solidFill>
-            <a:srgbClr val="CC0633"/>
-          </a:solidFill>
-          <a:ln>
-            <a:solidFill>
-              <a:srgbClr val="CC0633"/>
-            </a:solidFill>
-          </a:ln>
-        </p:spPr>
-        <p:style>
-          <a:lnRef idx="2">
-            <a:schemeClr val="accent1">
-              <a:shade val="50000"/>
-            </a:schemeClr>
-          </a:lnRef>
-          <a:fillRef idx="1">
-            <a:schemeClr val="accent1"/>
-          </a:fillRef>
-          <a:effectRef idx="0">
-            <a:schemeClr val="accent1"/>
-          </a:effectRef>
-          <a:fontRef idx="minor">
-            <a:schemeClr val="lt1"/>
-          </a:fontRef>
-        </p:style>
-        <p:txBody>
-          <a:bodyPr rtlCol="0" anchor="ctr"/>
-          <a:lstStyle/>
-          <a:p>
-            <a:pPr algn="ctr"/>
-            <a:endParaRPr lang="en-CA" dirty="0"/>
-          </a:p>
-        </p:txBody>
-      </p:sp>
-      <p:pic>
-        <p:nvPicPr>
-          <p:cNvPr id="6" name="Picture 5" descr="Graphical user interface, application&#10;&#10;Description automatically generated">
-            <a:extLst>
-              <a:ext uri="{FF2B5EF4-FFF2-40B4-BE49-F238E27FC236}">
-                <a16:creationId xmlns:a16="http://schemas.microsoft.com/office/drawing/2014/main" id="{C4748201-781A-4327-B179-0D6E205B4E49}"/>
-              </a:ext>
-            </a:extLst>
-          </p:cNvPr>
-          <p:cNvPicPr>
-            <a:picLocks noChangeAspect="1"/>
-          </p:cNvPicPr>
-          <p:nvPr/>
-        </p:nvPicPr>
-        <p:blipFill rotWithShape="1">
-          <a:blip r:embed="rId3">
-            <a:extLst>
-              <a:ext uri="{28A0092B-C50C-407E-A947-70E740481C1C}">
-                <a14:useLocalDpi xmlns:a14="http://schemas.microsoft.com/office/drawing/2010/main" val="0"/>
-              </a:ext>
-            </a:extLst>
-          </a:blip>
-          <a:srcRect r="58007" b="3574"/>
-          <a:stretch/>
-        </p:blipFill>
-        <p:spPr>
-          <a:xfrm>
-            <a:off x="1" y="-23419"/>
-            <a:ext cx="1187532" cy="632012"/>
-          </a:xfrm>
-          <a:prstGeom prst="rect">
-            <a:avLst/>
-          </a:prstGeom>
-        </p:spPr>
-      </p:pic>
-      <p:sp>
-        <p:nvSpPr>
-          <p:cNvPr id="2" name="文本框 1">
-            <a:extLst>
-              <a:ext uri="{FF2B5EF4-FFF2-40B4-BE49-F238E27FC236}">
-                <a16:creationId xmlns:a16="http://schemas.microsoft.com/office/drawing/2014/main" id="{F3344798-B676-4FE0-8E17-1763BD368CCF}"/>
-              </a:ext>
-            </a:extLst>
-          </p:cNvPr>
-          <p:cNvSpPr txBox="1"/>
-          <p:nvPr/>
-        </p:nvSpPr>
-        <p:spPr>
-          <a:xfrm>
-            <a:off x="58325" y="669807"/>
-            <a:ext cx="4652902" cy="830997"/>
-          </a:xfrm>
-          <a:prstGeom prst="rect">
-            <a:avLst/>
-          </a:prstGeom>
-          <a:noFill/>
-        </p:spPr>
-        <p:txBody>
-          <a:bodyPr rot="0" spcFirstLastPara="0" vertOverflow="overflow" horzOverflow="overflow" vert="horz" wrap="square" lIns="91440" tIns="45720" rIns="91440" bIns="45720" numCol="1" spcCol="0" rtlCol="0" fromWordArt="0" anchor="t" anchorCtr="0" forceAA="0" compatLnSpc="1">
-            <a:prstTxWarp prst="textNoShape">
-              <a:avLst/>
-            </a:prstTxWarp>
-            <a:spAutoFit/>
-          </a:bodyPr>
-          <a:lstStyle/>
-          <a:p>
-            <a:r>
-              <a:rPr lang="en-US" altLang="zh-CN" sz="4800" b="1" dirty="0">
-                <a:solidFill>
-                  <a:schemeClr val="bg1"/>
-                </a:solidFill>
-                <a:ea typeface="+mn-lt"/>
-                <a:cs typeface="+mn-lt"/>
-              </a:rPr>
-              <a:t>Results</a:t>
-            </a:r>
-            <a:endParaRPr lang="zh-CN" sz="4800" b="1" dirty="0">
-              <a:solidFill>
-                <a:schemeClr val="bg1"/>
-              </a:solidFill>
-              <a:ea typeface="+mn-lt"/>
-              <a:cs typeface="+mn-lt"/>
-            </a:endParaRPr>
-          </a:p>
-        </p:txBody>
-      </p:sp>
-      <p:sp>
-        <p:nvSpPr>
-          <p:cNvPr id="5" name="文本框 4">
-            <a:extLst>
-              <a:ext uri="{FF2B5EF4-FFF2-40B4-BE49-F238E27FC236}">
-                <a16:creationId xmlns:a16="http://schemas.microsoft.com/office/drawing/2014/main" id="{68B1BA4B-3F2D-413D-B877-61D78EEBE4EB}"/>
-              </a:ext>
-            </a:extLst>
-          </p:cNvPr>
-          <p:cNvSpPr txBox="1"/>
-          <p:nvPr/>
-        </p:nvSpPr>
-        <p:spPr>
-          <a:xfrm>
-            <a:off x="1955" y="1510594"/>
-            <a:ext cx="9807063" cy="584775"/>
-          </a:xfrm>
-          <a:prstGeom prst="rect">
-            <a:avLst/>
-          </a:prstGeom>
-          <a:noFill/>
-        </p:spPr>
-        <p:txBody>
-          <a:bodyPr rot="0" spcFirstLastPara="0" vertOverflow="overflow" horzOverflow="overflow" vert="horz" wrap="square" lIns="91440" tIns="45720" rIns="91440" bIns="45720" numCol="1" spcCol="0" rtlCol="0" fromWordArt="0" anchor="t" anchorCtr="0" forceAA="0" compatLnSpc="1">
-            <a:prstTxWarp prst="textNoShape">
-              <a:avLst/>
-            </a:prstTxWarp>
-            <a:spAutoFit/>
-          </a:bodyPr>
-          <a:lstStyle/>
-          <a:p>
-            <a:r>
-              <a:rPr lang="en-US" altLang="zh-CN" sz="3200" dirty="0">
-                <a:ea typeface="+mn-lt"/>
-                <a:cs typeface="+mn-lt"/>
-              </a:rPr>
               <a:t>Pipeline:</a:t>
             </a:r>
             <a:endParaRPr lang="zh-CN" sz="3200" dirty="0"/>
@@ -10117,14 +9223,14 @@
           <p:nvPr>
             <p:extLst>
               <p:ext uri="{D42A27DB-BD31-4B8C-83A1-F6EECF244321}">
-                <p14:modId xmlns:p14="http://schemas.microsoft.com/office/powerpoint/2010/main" val="1520126043"/>
+                <p14:modId xmlns:p14="http://schemas.microsoft.com/office/powerpoint/2010/main" val="1699685859"/>
               </p:ext>
             </p:extLst>
           </p:nvPr>
         </p:nvGraphicFramePr>
         <p:xfrm>
           <a:off x="2807856" y="2714719"/>
-          <a:ext cx="7204364" cy="2418233"/>
+          <a:ext cx="7204364" cy="1769222"/>
         </p:xfrm>
         <a:graphic>
           <a:graphicData uri="http://schemas.openxmlformats.org/drawingml/2006/table">
@@ -10274,225 +9380,6 @@
                 <a:extLst>
                   <a:ext uri="{0D108BD9-81ED-4DB2-BD59-A6C34878D82A}">
                     <a16:rowId xmlns:a16="http://schemas.microsoft.com/office/drawing/2014/main" val="1994514538"/>
-                  </a:ext>
-                </a:extLst>
-              </a:tr>
-              <a:tr h="649011">
-                <a:tc>
-                  <a:txBody>
-                    <a:bodyPr/>
-                    <a:lstStyle/>
-                    <a:p>
-                      <a:r>
-                        <a:rPr lang="en-CA" dirty="0"/>
-                        <a:t>~1000</a:t>
-                      </a:r>
-                    </a:p>
-                  </a:txBody>
-                  <a:tcPr>
-                    <a:lnL w="12700" cap="flat" cmpd="sng" algn="ctr">
-                      <a:solidFill>
-                        <a:schemeClr val="tx1"/>
-                      </a:solidFill>
-                      <a:prstDash val="solid"/>
-                      <a:round/>
-                      <a:headEnd type="none" w="med" len="med"/>
-                      <a:tailEnd type="none" w="med" len="med"/>
-                    </a:lnL>
-                    <a:lnR w="12700" cap="flat" cmpd="sng" algn="ctr">
-                      <a:solidFill>
-                        <a:schemeClr val="tx1"/>
-                      </a:solidFill>
-                      <a:prstDash val="solid"/>
-                      <a:round/>
-                      <a:headEnd type="none" w="med" len="med"/>
-                      <a:tailEnd type="none" w="med" len="med"/>
-                    </a:lnR>
-                    <a:lnT w="12700" cap="flat" cmpd="sng" algn="ctr">
-                      <a:solidFill>
-                        <a:schemeClr val="tx1"/>
-                      </a:solidFill>
-                      <a:prstDash val="solid"/>
-                      <a:round/>
-                      <a:headEnd type="none" w="med" len="med"/>
-                      <a:tailEnd type="none" w="med" len="med"/>
-                    </a:lnT>
-                    <a:lnB w="12700" cap="flat" cmpd="sng" algn="ctr">
-                      <a:solidFill>
-                        <a:schemeClr val="tx1"/>
-                      </a:solidFill>
-                      <a:prstDash val="solid"/>
-                      <a:round/>
-                      <a:headEnd type="none" w="med" len="med"/>
-                      <a:tailEnd type="none" w="med" len="med"/>
-                    </a:lnB>
-                    <a:solidFill>
-                      <a:schemeClr val="bg1"/>
-                    </a:solidFill>
-                  </a:tcPr>
-                </a:tc>
-                <a:tc>
-                  <a:txBody>
-                    <a:bodyPr/>
-                    <a:lstStyle/>
-                    <a:p>
-                      <a:r>
-                        <a:rPr lang="en-CA" dirty="0"/>
-                        <a:t>~100</a:t>
-                      </a:r>
-                    </a:p>
-                  </a:txBody>
-                  <a:tcPr>
-                    <a:lnL w="12700" cap="flat" cmpd="sng" algn="ctr">
-                      <a:solidFill>
-                        <a:schemeClr val="tx1"/>
-                      </a:solidFill>
-                      <a:prstDash val="solid"/>
-                      <a:round/>
-                      <a:headEnd type="none" w="med" len="med"/>
-                      <a:tailEnd type="none" w="med" len="med"/>
-                    </a:lnL>
-                    <a:lnR w="12700" cap="flat" cmpd="sng" algn="ctr">
-                      <a:solidFill>
-                        <a:schemeClr val="tx1"/>
-                      </a:solidFill>
-                      <a:prstDash val="solid"/>
-                      <a:round/>
-                      <a:headEnd type="none" w="med" len="med"/>
-                      <a:tailEnd type="none" w="med" len="med"/>
-                    </a:lnR>
-                    <a:lnT w="12700" cap="flat" cmpd="sng" algn="ctr">
-                      <a:solidFill>
-                        <a:schemeClr val="tx1"/>
-                      </a:solidFill>
-                      <a:prstDash val="solid"/>
-                      <a:round/>
-                      <a:headEnd type="none" w="med" len="med"/>
-                      <a:tailEnd type="none" w="med" len="med"/>
-                    </a:lnT>
-                    <a:lnB w="12700" cap="flat" cmpd="sng" algn="ctr">
-                      <a:solidFill>
-                        <a:schemeClr val="tx1"/>
-                      </a:solidFill>
-                      <a:prstDash val="solid"/>
-                      <a:round/>
-                      <a:headEnd type="none" w="med" len="med"/>
-                      <a:tailEnd type="none" w="med" len="med"/>
-                    </a:lnB>
-                    <a:solidFill>
-                      <a:schemeClr val="bg1"/>
-                    </a:solidFill>
-                  </a:tcPr>
-                </a:tc>
-                <a:tc>
-                  <a:txBody>
-                    <a:bodyPr/>
-                    <a:lstStyle/>
-                    <a:p>
-                      <a:r>
-                        <a:rPr lang="en-CA" dirty="0"/>
-                        <a:t>15</a:t>
-                      </a:r>
-                    </a:p>
-                  </a:txBody>
-                  <a:tcPr>
-                    <a:lnL w="12700" cap="flat" cmpd="sng" algn="ctr">
-                      <a:solidFill>
-                        <a:schemeClr val="tx1"/>
-                      </a:solidFill>
-                      <a:prstDash val="solid"/>
-                      <a:round/>
-                      <a:headEnd type="none" w="med" len="med"/>
-                      <a:tailEnd type="none" w="med" len="med"/>
-                    </a:lnL>
-                    <a:lnR w="12700" cap="flat" cmpd="sng" algn="ctr">
-                      <a:solidFill>
-                        <a:schemeClr val="tx1"/>
-                      </a:solidFill>
-                      <a:prstDash val="solid"/>
-                      <a:round/>
-                      <a:headEnd type="none" w="med" len="med"/>
-                      <a:tailEnd type="none" w="med" len="med"/>
-                    </a:lnR>
-                    <a:lnT w="12700" cap="flat" cmpd="sng" algn="ctr">
-                      <a:solidFill>
-                        <a:schemeClr val="tx1"/>
-                      </a:solidFill>
-                      <a:prstDash val="solid"/>
-                      <a:round/>
-                      <a:headEnd type="none" w="med" len="med"/>
-                      <a:tailEnd type="none" w="med" len="med"/>
-                    </a:lnT>
-                    <a:lnB w="12700" cap="flat" cmpd="sng" algn="ctr">
-                      <a:solidFill>
-                        <a:schemeClr val="tx1"/>
-                      </a:solidFill>
-                      <a:prstDash val="solid"/>
-                      <a:round/>
-                      <a:headEnd type="none" w="med" len="med"/>
-                      <a:tailEnd type="none" w="med" len="med"/>
-                    </a:lnB>
-                    <a:solidFill>
-                      <a:schemeClr val="bg1"/>
-                    </a:solidFill>
-                  </a:tcPr>
-                </a:tc>
-                <a:tc>
-                  <a:txBody>
-                    <a:bodyPr/>
-                    <a:lstStyle/>
-                    <a:p>
-                      <a:r>
-                        <a:rPr lang="en-CA" dirty="0"/>
-                        <a:t>89%</a:t>
-                      </a:r>
-                    </a:p>
-                  </a:txBody>
-                  <a:tcPr>
-                    <a:lnL w="12700" cap="flat" cmpd="sng" algn="ctr">
-                      <a:solidFill>
-                        <a:schemeClr val="tx1"/>
-                      </a:solidFill>
-                      <a:prstDash val="solid"/>
-                      <a:round/>
-                      <a:headEnd type="none" w="med" len="med"/>
-                      <a:tailEnd type="none" w="med" len="med"/>
-                    </a:lnL>
-                    <a:lnR w="12700" cap="flat" cmpd="sng" algn="ctr">
-                      <a:solidFill>
-                        <a:schemeClr val="tx1"/>
-                      </a:solidFill>
-                      <a:prstDash val="solid"/>
-                      <a:round/>
-                      <a:headEnd type="none" w="med" len="med"/>
-                      <a:tailEnd type="none" w="med" len="med"/>
-                    </a:lnR>
-                    <a:lnT w="12700" cap="flat" cmpd="sng" algn="ctr">
-                      <a:solidFill>
-                        <a:schemeClr val="tx1"/>
-                      </a:solidFill>
-                      <a:prstDash val="solid"/>
-                      <a:round/>
-                      <a:headEnd type="none" w="med" len="med"/>
-                      <a:tailEnd type="none" w="med" len="med"/>
-                    </a:lnT>
-                    <a:lnB w="12700" cap="flat" cmpd="sng" algn="ctr">
-                      <a:solidFill>
-                        <a:schemeClr val="tx1"/>
-                      </a:solidFill>
-                      <a:prstDash val="solid"/>
-                      <a:round/>
-                      <a:headEnd type="none" w="med" len="med"/>
-                      <a:tailEnd type="none" w="med" len="med"/>
-                    </a:lnB>
-                    <a:solidFill>
-                      <a:schemeClr val="bg1"/>
-                    </a:solidFill>
-                  </a:tcPr>
-                </a:tc>
-                <a:extLst>
-                  <a:ext uri="{0D108BD9-81ED-4DB2-BD59-A6C34878D82A}">
-                    <a16:rowId xmlns:a16="http://schemas.microsoft.com/office/drawing/2014/main" val="1495101624"/>
                   </a:ext>
                 </a:extLst>
               </a:tr>
@@ -10737,200 +9624,6 @@
       <p:transition spd="slow" advTm="61822"/>
     </mc:Fallback>
   </mc:AlternateContent>
-</p:sld>
-</file>
-
-<file path=ppt/slides/slide9.xml><?xml version="1.0" encoding="utf-8"?>
-<p:sld xmlns:a="http://schemas.openxmlformats.org/drawingml/2006/main" xmlns:r="http://schemas.openxmlformats.org/officeDocument/2006/relationships" xmlns:p="http://schemas.openxmlformats.org/presentationml/2006/main">
-  <p:cSld>
-    <p:spTree>
-      <p:nvGrpSpPr>
-        <p:cNvPr id="1" name=""/>
-        <p:cNvGrpSpPr/>
-        <p:nvPr/>
-      </p:nvGrpSpPr>
-      <p:grpSpPr>
-        <a:xfrm>
-          <a:off x="0" y="0"/>
-          <a:ext cx="0" cy="0"/>
-          <a:chOff x="0" y="0"/>
-          <a:chExt cx="0" cy="0"/>
-        </a:xfrm>
-      </p:grpSpPr>
-      <p:sp>
-        <p:nvSpPr>
-          <p:cNvPr id="4" name="Rectangle 3">
-            <a:extLst>
-              <a:ext uri="{FF2B5EF4-FFF2-40B4-BE49-F238E27FC236}">
-                <a16:creationId xmlns:a16="http://schemas.microsoft.com/office/drawing/2014/main" id="{9763CB71-770E-4583-9A6B-BFD2CD649B27}"/>
-              </a:ext>
-            </a:extLst>
-          </p:cNvPr>
-          <p:cNvSpPr/>
-          <p:nvPr/>
-        </p:nvSpPr>
-        <p:spPr>
-          <a:xfrm>
-            <a:off x="0" y="-18814"/>
-            <a:ext cx="12192000" cy="1412826"/>
-          </a:xfrm>
-          <a:prstGeom prst="rect">
-            <a:avLst/>
-          </a:prstGeom>
-          <a:solidFill>
-            <a:srgbClr val="CC0633"/>
-          </a:solidFill>
-          <a:ln>
-            <a:solidFill>
-              <a:srgbClr val="CC0633"/>
-            </a:solidFill>
-          </a:ln>
-        </p:spPr>
-        <p:style>
-          <a:lnRef idx="2">
-            <a:schemeClr val="accent1">
-              <a:shade val="50000"/>
-            </a:schemeClr>
-          </a:lnRef>
-          <a:fillRef idx="1">
-            <a:schemeClr val="accent1"/>
-          </a:fillRef>
-          <a:effectRef idx="0">
-            <a:schemeClr val="accent1"/>
-          </a:effectRef>
-          <a:fontRef idx="minor">
-            <a:schemeClr val="lt1"/>
-          </a:fontRef>
-        </p:style>
-        <p:txBody>
-          <a:bodyPr rtlCol="0" anchor="ctr"/>
-          <a:lstStyle/>
-          <a:p>
-            <a:pPr algn="ctr"/>
-            <a:endParaRPr lang="en-CA"/>
-          </a:p>
-        </p:txBody>
-      </p:sp>
-      <p:pic>
-        <p:nvPicPr>
-          <p:cNvPr id="6" name="Picture 5" descr="Graphical user interface, application&#10;&#10;Description automatically generated">
-            <a:extLst>
-              <a:ext uri="{FF2B5EF4-FFF2-40B4-BE49-F238E27FC236}">
-                <a16:creationId xmlns:a16="http://schemas.microsoft.com/office/drawing/2014/main" id="{C4748201-781A-4327-B179-0D6E205B4E49}"/>
-              </a:ext>
-            </a:extLst>
-          </p:cNvPr>
-          <p:cNvPicPr>
-            <a:picLocks noChangeAspect="1"/>
-          </p:cNvPicPr>
-          <p:nvPr/>
-        </p:nvPicPr>
-        <p:blipFill rotWithShape="1">
-          <a:blip r:embed="rId4">
-            <a:extLst>
-              <a:ext uri="{28A0092B-C50C-407E-A947-70E740481C1C}">
-                <a14:useLocalDpi xmlns:a14="http://schemas.microsoft.com/office/drawing/2010/main" val="0"/>
-              </a:ext>
-            </a:extLst>
-          </a:blip>
-          <a:srcRect r="58007" b="3574"/>
-          <a:stretch/>
-        </p:blipFill>
-        <p:spPr>
-          <a:xfrm>
-            <a:off x="1" y="-23419"/>
-            <a:ext cx="1187532" cy="632012"/>
-          </a:xfrm>
-          <a:prstGeom prst="rect">
-            <a:avLst/>
-          </a:prstGeom>
-        </p:spPr>
-      </p:pic>
-      <p:sp>
-        <p:nvSpPr>
-          <p:cNvPr id="2" name="文本框 1">
-            <a:extLst>
-              <a:ext uri="{FF2B5EF4-FFF2-40B4-BE49-F238E27FC236}">
-                <a16:creationId xmlns:a16="http://schemas.microsoft.com/office/drawing/2014/main" id="{F3344798-B676-4FE0-8E17-1763BD368CCF}"/>
-              </a:ext>
-            </a:extLst>
-          </p:cNvPr>
-          <p:cNvSpPr txBox="1"/>
-          <p:nvPr/>
-        </p:nvSpPr>
-        <p:spPr>
-          <a:xfrm>
-            <a:off x="58325" y="669807"/>
-            <a:ext cx="4652902" cy="830997"/>
-          </a:xfrm>
-          <a:prstGeom prst="rect">
-            <a:avLst/>
-          </a:prstGeom>
-          <a:noFill/>
-        </p:spPr>
-        <p:txBody>
-          <a:bodyPr rot="0" spcFirstLastPara="0" vertOverflow="overflow" horzOverflow="overflow" vert="horz" wrap="square" lIns="91440" tIns="45720" rIns="91440" bIns="45720" numCol="1" spcCol="0" rtlCol="0" fromWordArt="0" anchor="t" anchorCtr="0" forceAA="0" compatLnSpc="1">
-            <a:prstTxWarp prst="textNoShape">
-              <a:avLst/>
-            </a:prstTxWarp>
-            <a:spAutoFit/>
-          </a:bodyPr>
-          <a:lstStyle/>
-          <a:p>
-            <a:r>
-              <a:rPr lang="en-US" altLang="zh-CN" sz="4800" b="1" dirty="0">
-                <a:solidFill>
-                  <a:schemeClr val="bg1"/>
-                </a:solidFill>
-                <a:ea typeface="+mn-lt"/>
-                <a:cs typeface="+mn-lt"/>
-              </a:rPr>
-              <a:t>Demo</a:t>
-            </a:r>
-            <a:endParaRPr lang="zh-CN" sz="4800" b="1" dirty="0">
-              <a:solidFill>
-                <a:schemeClr val="bg1"/>
-              </a:solidFill>
-              <a:ea typeface="+mn-lt"/>
-              <a:cs typeface="+mn-lt"/>
-            </a:endParaRPr>
-          </a:p>
-        </p:txBody>
-      </p:sp>
-    </p:spTree>
-    <p:custDataLst>
-      <p:tags r:id="rId1"/>
-    </p:custDataLst>
-    <p:extLst>
-      <p:ext uri="{BB962C8B-B14F-4D97-AF65-F5344CB8AC3E}">
-        <p14:creationId xmlns:p14="http://schemas.microsoft.com/office/powerpoint/2010/main" val="1451829119"/>
-      </p:ext>
-    </p:extLst>
-  </p:cSld>
-  <p:clrMapOvr>
-    <a:masterClrMapping/>
-  </p:clrMapOvr>
-  <mc:AlternateContent xmlns:mc="http://schemas.openxmlformats.org/markup-compatibility/2006" xmlns:p14="http://schemas.microsoft.com/office/powerpoint/2010/main">
-    <mc:Choice Requires="p14">
-      <p:transition spd="slow" p14:dur="2000" advTm="64283"/>
-    </mc:Choice>
-    <mc:Fallback xmlns="">
-      <p:transition spd="slow" advTm="64283"/>
-    </mc:Fallback>
-  </mc:AlternateContent>
-  <p:extLst>
-    <p:ext uri="{E180D4A7-C9FB-4DFB-919C-405C955672EB}">
-      <p14:showEvtLst xmlns:p14="http://schemas.microsoft.com/office/powerpoint/2010/main">
-        <p14:playEvt time="2202" objId="3"/>
-        <p14:triggerEvt type="onClick" time="2202" objId="3"/>
-        <p14:triggerEvt type="onClick" time="28512" objId="3"/>
-        <p14:triggerEvt type="onClick" time="36423" objId="3"/>
-        <p14:stopEvt time="63194" objId="3"/>
-        <p14:playEvt time="63229" objId="3"/>
-        <p14:pauseEvt time="64246" objId="3"/>
-      </p14:showEvtLst>
-    </p:ext>
-  </p:extLst>
 </p:sld>
 </file>
 

</xml_diff>

<commit_message>
update model2 accuracy in final_presentation.pptx
</commit_message>
<xml_diff>
--- a/final_presentation.pptx
+++ b/final_presentation.pptx
@@ -121,6 +121,14 @@
 </p:presentation>
 </file>
 
+<file path=ppt/revisionInfo.xml><?xml version="1.0" encoding="utf-8"?>
+<p1510:revInfo xmlns:a="http://schemas.openxmlformats.org/drawingml/2006/main" xmlns:r="http://schemas.openxmlformats.org/officeDocument/2006/relationships" xmlns:p1510="http://schemas.microsoft.com/office/powerpoint/2015/10/main">
+  <p1510:revLst>
+    <p1510:client id="{F343E86E-89D6-445D-B84E-074C5151D33A}" v="2" dt="2022-04-11T09:23:55.973"/>
+  </p1510:revLst>
+</p1510:revInfo>
+</file>
+
 <file path=ppt/notesMasters/notesMaster1.xml><?xml version="1.0" encoding="utf-8"?>
 <p:notesMaster xmlns:a="http://schemas.openxmlformats.org/drawingml/2006/main" xmlns:r="http://schemas.openxmlformats.org/officeDocument/2006/relationships" xmlns:p="http://schemas.openxmlformats.org/presentationml/2006/main">
   <p:cSld>
@@ -203,7 +211,7 @@
           <a:p>
             <a:fld id="{8F171782-AB64-458D-AF37-69C59442B371}" type="datetimeFigureOut">
               <a:rPr lang="en-CA"/>
-              <a:t>2022-04-10</a:t>
+              <a:t>2022-04-11</a:t>
             </a:fld>
             <a:endParaRPr lang="en-US"/>
           </a:p>
@@ -1907,7 +1915,7 @@
           <a:p>
             <a:fld id="{C764DE79-268F-4C1A-8933-263129D2AF90}" type="datetimeFigureOut">
               <a:rPr lang="en-US" dirty="0"/>
-              <a:t>4/10/2022</a:t>
+              <a:t>4/11/2022</a:t>
             </a:fld>
             <a:endParaRPr lang="en-US"/>
           </a:p>
@@ -2075,7 +2083,7 @@
           <a:p>
             <a:fld id="{C764DE79-268F-4C1A-8933-263129D2AF90}" type="datetimeFigureOut">
               <a:rPr lang="en-US" dirty="0"/>
-              <a:t>4/10/2022</a:t>
+              <a:t>4/11/2022</a:t>
             </a:fld>
             <a:endParaRPr lang="en-US"/>
           </a:p>
@@ -2253,7 +2261,7 @@
           <a:p>
             <a:fld id="{C764DE79-268F-4C1A-8933-263129D2AF90}" type="datetimeFigureOut">
               <a:rPr lang="en-US" dirty="0"/>
-              <a:t>4/10/2022</a:t>
+              <a:t>4/11/2022</a:t>
             </a:fld>
             <a:endParaRPr lang="en-US"/>
           </a:p>
@@ -2421,7 +2429,7 @@
           <a:p>
             <a:fld id="{C764DE79-268F-4C1A-8933-263129D2AF90}" type="datetimeFigureOut">
               <a:rPr lang="en-US" dirty="0"/>
-              <a:t>4/10/2022</a:t>
+              <a:t>4/11/2022</a:t>
             </a:fld>
             <a:endParaRPr lang="en-US"/>
           </a:p>
@@ -2666,7 +2674,7 @@
           <a:p>
             <a:fld id="{C764DE79-268F-4C1A-8933-263129D2AF90}" type="datetimeFigureOut">
               <a:rPr lang="en-US" dirty="0"/>
-              <a:t>4/10/2022</a:t>
+              <a:t>4/11/2022</a:t>
             </a:fld>
             <a:endParaRPr lang="en-US"/>
           </a:p>
@@ -2895,7 +2903,7 @@
           <a:p>
             <a:fld id="{C764DE79-268F-4C1A-8933-263129D2AF90}" type="datetimeFigureOut">
               <a:rPr lang="en-US" dirty="0"/>
-              <a:t>4/10/2022</a:t>
+              <a:t>4/11/2022</a:t>
             </a:fld>
             <a:endParaRPr lang="en-US"/>
           </a:p>
@@ -3259,7 +3267,7 @@
           <a:p>
             <a:fld id="{C764DE79-268F-4C1A-8933-263129D2AF90}" type="datetimeFigureOut">
               <a:rPr lang="en-US" dirty="0"/>
-              <a:t>4/10/2022</a:t>
+              <a:t>4/11/2022</a:t>
             </a:fld>
             <a:endParaRPr lang="en-US"/>
           </a:p>
@@ -3376,7 +3384,7 @@
           <a:p>
             <a:fld id="{C764DE79-268F-4C1A-8933-263129D2AF90}" type="datetimeFigureOut">
               <a:rPr lang="en-US" dirty="0"/>
-              <a:t>4/10/2022</a:t>
+              <a:t>4/11/2022</a:t>
             </a:fld>
             <a:endParaRPr lang="en-US"/>
           </a:p>
@@ -3471,7 +3479,7 @@
           <a:p>
             <a:fld id="{C764DE79-268F-4C1A-8933-263129D2AF90}" type="datetimeFigureOut">
               <a:rPr lang="en-US" dirty="0"/>
-              <a:t>4/10/2022</a:t>
+              <a:t>4/11/2022</a:t>
             </a:fld>
             <a:endParaRPr lang="en-US"/>
           </a:p>
@@ -3746,7 +3754,7 @@
           <a:p>
             <a:fld id="{C764DE79-268F-4C1A-8933-263129D2AF90}" type="datetimeFigureOut">
               <a:rPr lang="en-US" dirty="0"/>
-              <a:t>4/10/2022</a:t>
+              <a:t>4/11/2022</a:t>
             </a:fld>
             <a:endParaRPr lang="en-US"/>
           </a:p>
@@ -3998,7 +4006,7 @@
           <a:p>
             <a:fld id="{C764DE79-268F-4C1A-8933-263129D2AF90}" type="datetimeFigureOut">
               <a:rPr lang="en-US" dirty="0"/>
-              <a:t>4/10/2022</a:t>
+              <a:t>4/11/2022</a:t>
             </a:fld>
             <a:endParaRPr lang="en-US"/>
           </a:p>
@@ -4209,7 +4217,7 @@
           <a:p>
             <a:fld id="{C764DE79-268F-4C1A-8933-263129D2AF90}" type="datetimeFigureOut">
               <a:rPr lang="en-US" dirty="0"/>
-              <a:t>4/10/2022</a:t>
+              <a:t>4/11/2022</a:t>
             </a:fld>
             <a:endParaRPr lang="en-US"/>
           </a:p>
@@ -10388,11 +10396,18 @@
               <a:t>Top 1 Accuracy: </a:t>
             </a:r>
             <a:r>
+              <a:rPr lang="en-US" altLang="zh-CN" sz="3200" b="1">
+                <a:ea typeface="+mn-lt"/>
+                <a:cs typeface="+mn-lt"/>
+              </a:rPr>
+              <a:t>85</a:t>
+            </a:r>
+            <a:r>
               <a:rPr lang="en-US" altLang="zh-CN" sz="3200" b="1" dirty="0">
                 <a:ea typeface="+mn-lt"/>
                 <a:cs typeface="+mn-lt"/>
               </a:rPr>
-              <a:t>96%</a:t>
+              <a:t>%</a:t>
             </a:r>
             <a:endParaRPr lang="zh-CN" sz="3200" b="1" dirty="0"/>
           </a:p>
@@ -10458,11 +10473,11 @@
   <p:clrMapOvr>
     <a:masterClrMapping/>
   </p:clrMapOvr>
-  <mc:AlternateContent xmlns:mc="http://schemas.openxmlformats.org/markup-compatibility/2006" xmlns:p14="http://schemas.microsoft.com/office/powerpoint/2010/main">
-    <mc:Choice Requires="p14">
+  <mc:AlternateContent xmlns:mc="http://schemas.openxmlformats.org/markup-compatibility/2006">
+    <mc:Choice xmlns:p14="http://schemas.microsoft.com/office/powerpoint/2010/main" Requires="p14">
       <p:transition spd="slow" p14:dur="2000" advTm="61822"/>
     </mc:Choice>
-    <mc:Fallback xmlns="">
+    <mc:Fallback>
       <p:transition spd="slow" advTm="61822"/>
     </mc:Fallback>
   </mc:AlternateContent>

</xml_diff>

<commit_message>
small update to final presentation notes
</commit_message>
<xml_diff>
--- a/final_presentation.pptx
+++ b/final_presentation.pptx
@@ -1701,7 +1701,7 @@
           <a:p>
             <a:r>
               <a:rPr lang="en-US" dirty="0"/>
-              <a:t>1.) In the first, we designated 1000 dogs as lost and 100 dogs as found.  We then calculated the percentage of lost dogs that we returned in the top 15 matches with respect to the found dogs.  We achieved an accuracy of 89%.</a:t>
+              <a:t>1.) In the first, we designated 1000 dogs as lost and 100 dogs as found using the test data.  We then calculated the percentage of lost dogs that we returned in the top 15 matches with respect to the found dogs.  We achieved an accuracy of 89%.</a:t>
             </a:r>
           </a:p>
           <a:p>
@@ -1713,7 +1713,7 @@
           <a:p>
             <a:r>
               <a:rPr lang="en-US" dirty="0"/>
-              <a:t>2.) In the second test we reduced the number of lost dogs to 500.  We achieved an accuracy of 98%.</a:t>
+              <a:t>2.) In the second test we reduced the number of lost dogs to 500 and the number of found dogs to 50 using the validation data.  We achieved an accuracy of 98%.</a:t>
             </a:r>
           </a:p>
           <a:p>

</xml_diff>